<commit_message>
REG_PREDICTOR_COLLISION problem reproduced successfully
</commit_message>
<xml_diff>
--- a/Jongseob/predictor_collision_test/resource/predictor_collision_test_block_diagram.pptx
+++ b/Jongseob/predictor_collision_test/resource/predictor_collision_test_block_diagram.pptx
@@ -6,6 +6,8 @@
   </p:sldMasterIdLst>
   <p:sldIdLst>
     <p:sldId id="256" r:id="rId2"/>
+    <p:sldId id="257" r:id="rId3"/>
+    <p:sldId id="258" r:id="rId4"/>
   </p:sldIdLst>
   <p:sldSz cx="12192000" cy="6858000"/>
   <p:notesSz cx="6858000" cy="9144000"/>
@@ -3395,7 +3397,7 @@
         <p:spPr>
           <a:xfrm>
             <a:off x="282180" y="184667"/>
-            <a:ext cx="9021840" cy="6473308"/>
+            <a:ext cx="8358481" cy="6473308"/>
           </a:xfrm>
           <a:prstGeom prst="rect">
             <a:avLst/>
@@ -3465,36 +3467,6 @@
           </a:p>
         </p:txBody>
       </p:sp>
-      <p:pic>
-        <p:nvPicPr>
-          <p:cNvPr id="9" name="그림 8">
-            <a:extLst>
-              <a:ext uri="{FF2B5EF4-FFF2-40B4-BE49-F238E27FC236}">
-                <a16:creationId xmlns:a16="http://schemas.microsoft.com/office/drawing/2014/main" id="{31093C6F-DDDE-40B8-8451-49681A20FF47}"/>
-              </a:ext>
-            </a:extLst>
-          </p:cNvPr>
-          <p:cNvPicPr>
-            <a:picLocks noChangeAspect="1"/>
-          </p:cNvPicPr>
-          <p:nvPr/>
-        </p:nvPicPr>
-        <p:blipFill>
-          <a:blip r:embed="rId2"/>
-          <a:stretch>
-            <a:fillRect/>
-          </a:stretch>
-        </p:blipFill>
-        <p:spPr>
-          <a:xfrm>
-            <a:off x="3505892" y="-6178112"/>
-            <a:ext cx="6029325" cy="5676900"/>
-          </a:xfrm>
-          <a:prstGeom prst="rect">
-            <a:avLst/>
-          </a:prstGeom>
-        </p:spPr>
-      </p:pic>
       <p:sp>
         <p:nvSpPr>
           <p:cNvPr id="10" name="직사각형 9">
@@ -3546,7 +3518,15 @@
                   <a:sysClr val="windowText" lastClr="000000"/>
                 </a:solidFill>
               </a:rPr>
-              <a:t>bus_if</a:t>
+              <a:t>apb_if</a:t>
+            </a:r>
+            <a:r>
+              <a:rPr lang="en-US" altLang="ko-KR" dirty="0">
+                <a:solidFill>
+                  <a:sysClr val="windowText" lastClr="000000"/>
+                </a:solidFill>
+              </a:rPr>
+              <a:t> (32-bit width)</a:t>
             </a:r>
             <a:endParaRPr lang="ko-KR" altLang="en-US" dirty="0">
               <a:solidFill>
@@ -3602,8 +3582,8 @@
           <a:p>
             <a:pPr algn="ctr"/>
             <a:r>
-              <a:rPr lang="en-US" altLang="ko-KR"/>
-              <a:t>traffic</a:t>
+              <a:rPr lang="en-US" altLang="ko-KR" dirty="0"/>
+              <a:t>design</a:t>
             </a:r>
             <a:endParaRPr lang="ko-KR" altLang="en-US" dirty="0"/>
           </a:p>
@@ -3624,7 +3604,7 @@
         <p:grpSpPr>
           <a:xfrm>
             <a:off x="585786" y="574766"/>
-            <a:ext cx="8481465" cy="5956663"/>
+            <a:ext cx="7863305" cy="5956663"/>
             <a:chOff x="585786" y="574766"/>
             <a:chExt cx="8481465" cy="5956663"/>
           </a:xfrm>
@@ -3729,7 +3709,7 @@
         </p:nvSpPr>
         <p:spPr>
           <a:xfrm>
-            <a:off x="2346342" y="2354165"/>
+            <a:off x="1713017" y="2354165"/>
             <a:ext cx="6485238" cy="1405545"/>
           </a:xfrm>
           <a:prstGeom prst="rect">
@@ -3783,8 +3763,8 @@
         </p:nvSpPr>
         <p:spPr>
           <a:xfrm>
-            <a:off x="2401541" y="2365596"/>
-            <a:ext cx="1274708" cy="369332"/>
+            <a:off x="1768216" y="2365596"/>
+            <a:ext cx="1401346" cy="369332"/>
           </a:xfrm>
           <a:prstGeom prst="rect">
             <a:avLst/>
@@ -3798,8 +3778,8 @@
           <a:lstStyle/>
           <a:p>
             <a:r>
-              <a:rPr lang="en-US" altLang="ko-KR" dirty="0" err="1"/>
-              <a:t>apb_agent</a:t>
+              <a:rPr lang="en-US" altLang="ko-KR" dirty="0"/>
+              <a:t>apb_agent0</a:t>
             </a:r>
             <a:endParaRPr lang="ko-KR" altLang="en-US" dirty="0"/>
           </a:p>
@@ -3819,7 +3799,7 @@
         </p:nvSpPr>
         <p:spPr>
           <a:xfrm>
-            <a:off x="6737856" y="2428670"/>
+            <a:off x="6104531" y="2428670"/>
             <a:ext cx="1711235" cy="523024"/>
           </a:xfrm>
           <a:prstGeom prst="rect">
@@ -3872,8 +3852,8 @@
         </p:nvGrpSpPr>
         <p:grpSpPr>
           <a:xfrm>
-            <a:off x="776359" y="3900880"/>
-            <a:ext cx="8055221" cy="2499919"/>
+            <a:off x="776360" y="3900880"/>
+            <a:ext cx="7421896" cy="2499919"/>
             <a:chOff x="776359" y="2526895"/>
             <a:chExt cx="8055221" cy="3873905"/>
           </a:xfrm>
@@ -3947,7 +3927,7 @@
           <p:spPr>
             <a:xfrm>
               <a:off x="776359" y="2526895"/>
-              <a:ext cx="1034707" cy="369331"/>
+              <a:ext cx="1209652" cy="572321"/>
             </a:xfrm>
             <a:prstGeom prst="rect">
               <a:avLst/>
@@ -3984,7 +3964,7 @@
         <p:grpSpPr>
           <a:xfrm>
             <a:off x="880636" y="4924056"/>
-            <a:ext cx="7790924" cy="1359177"/>
+            <a:ext cx="6871512" cy="1359177"/>
             <a:chOff x="880636" y="3792132"/>
             <a:chExt cx="7790924" cy="2491102"/>
           </a:xfrm>
@@ -4056,7 +4036,7 @@
           <p:spPr>
             <a:xfrm>
               <a:off x="901516" y="3792132"/>
-              <a:ext cx="3230308" cy="369332"/>
+              <a:ext cx="1810506" cy="676912"/>
             </a:xfrm>
             <a:prstGeom prst="rect">
               <a:avLst/>
@@ -4071,19 +4051,7 @@
             <a:p>
               <a:r>
                 <a:rPr lang="en-US" altLang="ko-KR" dirty="0" err="1"/>
-                <a:t>ral_sys_traffic</a:t>
-              </a:r>
-              <a:r>
-                <a:rPr lang="en-US" altLang="ko-KR" dirty="0"/>
-                <a:t>(</a:t>
-              </a:r>
-              <a:r>
-                <a:rPr lang="en-US" altLang="ko-KR" dirty="0" err="1"/>
-                <a:t>uvm_reg_block</a:t>
-              </a:r>
-              <a:r>
-                <a:rPr lang="en-US" altLang="ko-KR" dirty="0"/>
-                <a:t>)</a:t>
+                <a:t>my_reg_block</a:t>
               </a:r>
               <a:endParaRPr lang="ko-KR" altLang="en-US" dirty="0"/>
             </a:p>
@@ -4104,7 +4072,7 @@
         </p:nvSpPr>
         <p:spPr>
           <a:xfrm>
-            <a:off x="6737856" y="3085559"/>
+            <a:off x="6104531" y="3085559"/>
             <a:ext cx="1711235" cy="523024"/>
           </a:xfrm>
           <a:prstGeom prst="rect">
@@ -4157,7 +4125,7 @@
         </p:nvSpPr>
         <p:spPr>
           <a:xfrm>
-            <a:off x="6424749" y="4184481"/>
+            <a:off x="5505337" y="4184481"/>
             <a:ext cx="2246811" cy="598405"/>
           </a:xfrm>
           <a:prstGeom prst="rect">
@@ -4218,7 +4186,7 @@
         </p:nvSpPr>
         <p:spPr>
           <a:xfrm>
-            <a:off x="3470628" y="3070603"/>
+            <a:off x="2837303" y="3070603"/>
             <a:ext cx="2092135" cy="559754"/>
           </a:xfrm>
           <a:prstGeom prst="rect">
@@ -4257,95 +4225,6 @@
           </a:p>
         </p:txBody>
       </p:sp>
-      <p:cxnSp>
-        <p:nvCxnSpPr>
-          <p:cNvPr id="32" name="직선 화살표 연결선 31">
-            <a:extLst>
-              <a:ext uri="{FF2B5EF4-FFF2-40B4-BE49-F238E27FC236}">
-                <a16:creationId xmlns:a16="http://schemas.microsoft.com/office/drawing/2014/main" id="{87C30B94-2A15-4EB5-A9C4-24629E6A5FBE}"/>
-              </a:ext>
-            </a:extLst>
-          </p:cNvPr>
-          <p:cNvCxnSpPr>
-            <a:cxnSpLocks/>
-            <a:stCxn id="15" idx="3"/>
-          </p:cNvCxnSpPr>
-          <p:nvPr/>
-        </p:nvCxnSpPr>
-        <p:spPr>
-          <a:xfrm>
-            <a:off x="8449091" y="2690182"/>
-            <a:ext cx="1094763" cy="0"/>
-          </a:xfrm>
-          <a:prstGeom prst="straightConnector1">
-            <a:avLst/>
-          </a:prstGeom>
-          <a:ln w="28575">
-            <a:solidFill>
-              <a:schemeClr val="tx1"/>
-            </a:solidFill>
-            <a:tailEnd type="triangle"/>
-          </a:ln>
-        </p:spPr>
-        <p:style>
-          <a:lnRef idx="1">
-            <a:schemeClr val="accent1"/>
-          </a:lnRef>
-          <a:fillRef idx="0">
-            <a:schemeClr val="accent1"/>
-          </a:fillRef>
-          <a:effectRef idx="0">
-            <a:schemeClr val="accent1"/>
-          </a:effectRef>
-          <a:fontRef idx="minor">
-            <a:schemeClr val="tx1"/>
-          </a:fontRef>
-        </p:style>
-      </p:cxnSp>
-      <p:cxnSp>
-        <p:nvCxnSpPr>
-          <p:cNvPr id="34" name="직선 화살표 연결선 33">
-            <a:extLst>
-              <a:ext uri="{FF2B5EF4-FFF2-40B4-BE49-F238E27FC236}">
-                <a16:creationId xmlns:a16="http://schemas.microsoft.com/office/drawing/2014/main" id="{44B91D2A-92BB-4E62-BB83-13CD08D4D82C}"/>
-              </a:ext>
-            </a:extLst>
-          </p:cNvPr>
-          <p:cNvCxnSpPr>
-            <a:cxnSpLocks/>
-          </p:cNvCxnSpPr>
-          <p:nvPr/>
-        </p:nvCxnSpPr>
-        <p:spPr>
-          <a:xfrm flipH="1">
-            <a:off x="8449091" y="3461371"/>
-            <a:ext cx="1094763" cy="0"/>
-          </a:xfrm>
-          <a:prstGeom prst="straightConnector1">
-            <a:avLst/>
-          </a:prstGeom>
-          <a:ln w="28575">
-            <a:solidFill>
-              <a:schemeClr val="tx1"/>
-            </a:solidFill>
-            <a:tailEnd type="triangle"/>
-          </a:ln>
-        </p:spPr>
-        <p:style>
-          <a:lnRef idx="1">
-            <a:schemeClr val="accent1"/>
-          </a:lnRef>
-          <a:fillRef idx="0">
-            <a:schemeClr val="accent1"/>
-          </a:fillRef>
-          <a:effectRef idx="0">
-            <a:schemeClr val="accent1"/>
-          </a:effectRef>
-          <a:fontRef idx="minor">
-            <a:schemeClr val="tx1"/>
-          </a:fontRef>
-        </p:style>
-      </p:cxnSp>
       <p:sp>
         <p:nvSpPr>
           <p:cNvPr id="38" name="직사각형 37">
@@ -4360,7 +4239,7 @@
         </p:nvSpPr>
         <p:spPr>
           <a:xfrm>
-            <a:off x="4234832" y="5184396"/>
+            <a:off x="5850117" y="5222741"/>
             <a:ext cx="1557249" cy="959230"/>
           </a:xfrm>
           <a:prstGeom prst="rect">
@@ -4507,7 +4386,7 @@
         </p:nvCxnSpPr>
         <p:spPr>
           <a:xfrm flipV="1">
-            <a:off x="5564352" y="2690182"/>
+            <a:off x="4931027" y="2690182"/>
             <a:ext cx="1173504" cy="656890"/>
           </a:xfrm>
           <a:prstGeom prst="straightConnector1">
@@ -4549,7 +4428,7 @@
         </p:nvSpPr>
         <p:spPr>
           <a:xfrm>
-            <a:off x="2346342" y="761693"/>
+            <a:off x="1713017" y="761693"/>
             <a:ext cx="6485238" cy="1405545"/>
           </a:xfrm>
           <a:prstGeom prst="rect">
@@ -4603,8 +4482,8 @@
         </p:nvSpPr>
         <p:spPr>
           <a:xfrm>
-            <a:off x="2401541" y="773124"/>
-            <a:ext cx="1274708" cy="369332"/>
+            <a:off x="1768216" y="773124"/>
+            <a:ext cx="1401346" cy="369332"/>
           </a:xfrm>
           <a:prstGeom prst="rect">
             <a:avLst/>
@@ -4618,8 +4497,8 @@
           <a:lstStyle/>
           <a:p>
             <a:r>
-              <a:rPr lang="en-US" altLang="ko-KR" dirty="0" err="1"/>
-              <a:t>apb_agent</a:t>
+              <a:rPr lang="en-US" altLang="ko-KR" dirty="0"/>
+              <a:t>apb_agent1</a:t>
             </a:r>
             <a:endParaRPr lang="ko-KR" altLang="en-US" dirty="0"/>
           </a:p>
@@ -4639,7 +4518,7 @@
         </p:nvSpPr>
         <p:spPr>
           <a:xfrm>
-            <a:off x="6737856" y="836198"/>
+            <a:off x="6104531" y="836198"/>
             <a:ext cx="1711235" cy="523024"/>
           </a:xfrm>
           <a:prstGeom prst="rect">
@@ -4692,7 +4571,7 @@
         </p:nvSpPr>
         <p:spPr>
           <a:xfrm>
-            <a:off x="6737856" y="1493087"/>
+            <a:off x="6104531" y="1493087"/>
             <a:ext cx="1711235" cy="523024"/>
           </a:xfrm>
           <a:prstGeom prst="rect">
@@ -4745,7 +4624,7 @@
         </p:nvSpPr>
         <p:spPr>
           <a:xfrm>
-            <a:off x="3470628" y="1478131"/>
+            <a:off x="2837303" y="1478131"/>
             <a:ext cx="2092135" cy="559754"/>
           </a:xfrm>
           <a:prstGeom prst="rect">
@@ -4800,11 +4679,518 @@
         </p:nvCxnSpPr>
         <p:spPr>
           <a:xfrm flipV="1">
-            <a:off x="5564352" y="1079101"/>
+            <a:off x="4931027" y="1079101"/>
             <a:ext cx="1173504" cy="656890"/>
           </a:xfrm>
           <a:prstGeom prst="straightConnector1">
             <a:avLst/>
+          </a:prstGeom>
+          <a:ln w="28575">
+            <a:solidFill>
+              <a:schemeClr val="tx1"/>
+            </a:solidFill>
+            <a:tailEnd type="triangle"/>
+          </a:ln>
+        </p:spPr>
+        <p:style>
+          <a:lnRef idx="1">
+            <a:schemeClr val="accent1"/>
+          </a:lnRef>
+          <a:fillRef idx="0">
+            <a:schemeClr val="accent1"/>
+          </a:fillRef>
+          <a:effectRef idx="0">
+            <a:schemeClr val="accent1"/>
+          </a:effectRef>
+          <a:fontRef idx="minor">
+            <a:schemeClr val="tx1"/>
+          </a:fontRef>
+        </p:style>
+      </p:cxnSp>
+      <p:cxnSp>
+        <p:nvCxnSpPr>
+          <p:cNvPr id="25" name="직선 화살표 연결선 24">
+            <a:extLst>
+              <a:ext uri="{FF2B5EF4-FFF2-40B4-BE49-F238E27FC236}">
+                <a16:creationId xmlns:a16="http://schemas.microsoft.com/office/drawing/2014/main" id="{CE1A7F1C-029A-42D2-B15B-C086E32437A8}"/>
+              </a:ext>
+            </a:extLst>
+          </p:cNvPr>
+          <p:cNvCxnSpPr>
+            <a:stCxn id="62" idx="3"/>
+          </p:cNvCxnSpPr>
+          <p:nvPr/>
+        </p:nvCxnSpPr>
+        <p:spPr>
+          <a:xfrm>
+            <a:off x="7815766" y="1097710"/>
+            <a:ext cx="1728088" cy="0"/>
+          </a:xfrm>
+          <a:prstGeom prst="straightConnector1">
+            <a:avLst/>
+          </a:prstGeom>
+          <a:ln w="28575">
+            <a:solidFill>
+              <a:schemeClr val="tx1"/>
+            </a:solidFill>
+            <a:tailEnd type="triangle"/>
+          </a:ln>
+        </p:spPr>
+        <p:style>
+          <a:lnRef idx="1">
+            <a:schemeClr val="accent1"/>
+          </a:lnRef>
+          <a:fillRef idx="0">
+            <a:schemeClr val="accent1"/>
+          </a:fillRef>
+          <a:effectRef idx="0">
+            <a:schemeClr val="accent1"/>
+          </a:effectRef>
+          <a:fontRef idx="minor">
+            <a:schemeClr val="tx1"/>
+          </a:fontRef>
+        </p:style>
+      </p:cxnSp>
+      <p:cxnSp>
+        <p:nvCxnSpPr>
+          <p:cNvPr id="30" name="직선 화살표 연결선 29">
+            <a:extLst>
+              <a:ext uri="{FF2B5EF4-FFF2-40B4-BE49-F238E27FC236}">
+                <a16:creationId xmlns:a16="http://schemas.microsoft.com/office/drawing/2014/main" id="{75BD6C11-23AA-4D60-9746-0A44078539C7}"/>
+              </a:ext>
+            </a:extLst>
+          </p:cNvPr>
+          <p:cNvCxnSpPr>
+            <a:stCxn id="15" idx="3"/>
+          </p:cNvCxnSpPr>
+          <p:nvPr/>
+        </p:nvCxnSpPr>
+        <p:spPr>
+          <a:xfrm>
+            <a:off x="7815766" y="2690182"/>
+            <a:ext cx="1728088" cy="0"/>
+          </a:xfrm>
+          <a:prstGeom prst="straightConnector1">
+            <a:avLst/>
+          </a:prstGeom>
+          <a:ln w="28575">
+            <a:solidFill>
+              <a:schemeClr val="tx1"/>
+            </a:solidFill>
+            <a:tailEnd type="triangle"/>
+          </a:ln>
+        </p:spPr>
+        <p:style>
+          <a:lnRef idx="1">
+            <a:schemeClr val="accent1"/>
+          </a:lnRef>
+          <a:fillRef idx="0">
+            <a:schemeClr val="accent1"/>
+          </a:fillRef>
+          <a:effectRef idx="0">
+            <a:schemeClr val="accent1"/>
+          </a:effectRef>
+          <a:fontRef idx="minor">
+            <a:schemeClr val="tx1"/>
+          </a:fontRef>
+        </p:style>
+      </p:cxnSp>
+      <p:cxnSp>
+        <p:nvCxnSpPr>
+          <p:cNvPr id="35" name="직선 화살표 연결선 34">
+            <a:extLst>
+              <a:ext uri="{FF2B5EF4-FFF2-40B4-BE49-F238E27FC236}">
+                <a16:creationId xmlns:a16="http://schemas.microsoft.com/office/drawing/2014/main" id="{553F0945-5E8F-4560-9CA9-928AE2C07190}"/>
+              </a:ext>
+            </a:extLst>
+          </p:cNvPr>
+          <p:cNvCxnSpPr>
+            <a:endCxn id="63" idx="3"/>
+          </p:cNvCxnSpPr>
+          <p:nvPr/>
+        </p:nvCxnSpPr>
+        <p:spPr>
+          <a:xfrm flipH="1">
+            <a:off x="7815766" y="1754599"/>
+            <a:ext cx="1719451" cy="0"/>
+          </a:xfrm>
+          <a:prstGeom prst="straightConnector1">
+            <a:avLst/>
+          </a:prstGeom>
+          <a:ln w="28575">
+            <a:solidFill>
+              <a:schemeClr val="tx1"/>
+            </a:solidFill>
+            <a:tailEnd type="triangle"/>
+          </a:ln>
+        </p:spPr>
+        <p:style>
+          <a:lnRef idx="1">
+            <a:schemeClr val="accent1"/>
+          </a:lnRef>
+          <a:fillRef idx="0">
+            <a:schemeClr val="accent1"/>
+          </a:fillRef>
+          <a:effectRef idx="0">
+            <a:schemeClr val="accent1"/>
+          </a:effectRef>
+          <a:fontRef idx="minor">
+            <a:schemeClr val="tx1"/>
+          </a:fontRef>
+        </p:style>
+      </p:cxnSp>
+      <p:cxnSp>
+        <p:nvCxnSpPr>
+          <p:cNvPr id="47" name="직선 화살표 연결선 46">
+            <a:extLst>
+              <a:ext uri="{FF2B5EF4-FFF2-40B4-BE49-F238E27FC236}">
+                <a16:creationId xmlns:a16="http://schemas.microsoft.com/office/drawing/2014/main" id="{88956934-E53D-435F-90D8-487163584A04}"/>
+              </a:ext>
+            </a:extLst>
+          </p:cNvPr>
+          <p:cNvCxnSpPr/>
+          <p:nvPr/>
+        </p:nvCxnSpPr>
+        <p:spPr>
+          <a:xfrm flipH="1">
+            <a:off x="7815766" y="3349070"/>
+            <a:ext cx="1719451" cy="0"/>
+          </a:xfrm>
+          <a:prstGeom prst="straightConnector1">
+            <a:avLst/>
+          </a:prstGeom>
+          <a:ln w="28575">
+            <a:solidFill>
+              <a:schemeClr val="tx1"/>
+            </a:solidFill>
+            <a:tailEnd type="triangle"/>
+          </a:ln>
+        </p:spPr>
+        <p:style>
+          <a:lnRef idx="1">
+            <a:schemeClr val="accent1"/>
+          </a:lnRef>
+          <a:fillRef idx="0">
+            <a:schemeClr val="accent1"/>
+          </a:fillRef>
+          <a:effectRef idx="0">
+            <a:schemeClr val="accent1"/>
+          </a:effectRef>
+          <a:fontRef idx="minor">
+            <a:schemeClr val="tx1"/>
+          </a:fontRef>
+        </p:style>
+      </p:cxnSp>
+      <p:sp>
+        <p:nvSpPr>
+          <p:cNvPr id="48" name="다이아몬드 47">
+            <a:extLst>
+              <a:ext uri="{FF2B5EF4-FFF2-40B4-BE49-F238E27FC236}">
+                <a16:creationId xmlns:a16="http://schemas.microsoft.com/office/drawing/2014/main" id="{281FC83F-44C5-4E77-9DDB-0445AE310508}"/>
+              </a:ext>
+            </a:extLst>
+          </p:cNvPr>
+          <p:cNvSpPr/>
+          <p:nvPr/>
+        </p:nvSpPr>
+        <p:spPr>
+          <a:xfrm>
+            <a:off x="6939364" y="3634219"/>
+            <a:ext cx="254214" cy="237491"/>
+          </a:xfrm>
+          <a:prstGeom prst="diamond">
+            <a:avLst/>
+          </a:prstGeom>
+          <a:solidFill>
+            <a:srgbClr val="FFC000"/>
+          </a:solidFill>
+          <a:ln w="38100">
+            <a:solidFill>
+              <a:schemeClr val="tx1"/>
+            </a:solidFill>
+          </a:ln>
+        </p:spPr>
+        <p:style>
+          <a:lnRef idx="2">
+            <a:schemeClr val="accent1">
+              <a:shade val="50000"/>
+            </a:schemeClr>
+          </a:lnRef>
+          <a:fillRef idx="1">
+            <a:schemeClr val="accent1"/>
+          </a:fillRef>
+          <a:effectRef idx="0">
+            <a:schemeClr val="accent1"/>
+          </a:effectRef>
+          <a:fontRef idx="minor">
+            <a:schemeClr val="lt1"/>
+          </a:fontRef>
+        </p:style>
+        <p:txBody>
+          <a:bodyPr rtlCol="0" anchor="ctr"/>
+          <a:lstStyle/>
+          <a:p>
+            <a:pPr algn="ctr"/>
+            <a:endParaRPr lang="ko-KR" altLang="en-US"/>
+          </a:p>
+        </p:txBody>
+      </p:sp>
+      <p:cxnSp>
+        <p:nvCxnSpPr>
+          <p:cNvPr id="49" name="직선 화살표 연결선 48">
+            <a:extLst>
+              <a:ext uri="{FF2B5EF4-FFF2-40B4-BE49-F238E27FC236}">
+                <a16:creationId xmlns:a16="http://schemas.microsoft.com/office/drawing/2014/main" id="{4F21C2C3-F65E-4CCA-BD27-95DE79024F30}"/>
+              </a:ext>
+            </a:extLst>
+          </p:cNvPr>
+          <p:cNvCxnSpPr>
+            <a:cxnSpLocks/>
+            <a:stCxn id="48" idx="2"/>
+          </p:cNvCxnSpPr>
+          <p:nvPr/>
+        </p:nvCxnSpPr>
+        <p:spPr>
+          <a:xfrm>
+            <a:off x="7066471" y="3871710"/>
+            <a:ext cx="0" cy="312771"/>
+          </a:xfrm>
+          <a:prstGeom prst="straightConnector1">
+            <a:avLst/>
+          </a:prstGeom>
+          <a:ln w="38100">
+            <a:solidFill>
+              <a:schemeClr val="tx1"/>
+            </a:solidFill>
+            <a:tailEnd type="triangle"/>
+          </a:ln>
+        </p:spPr>
+        <p:style>
+          <a:lnRef idx="1">
+            <a:schemeClr val="accent1"/>
+          </a:lnRef>
+          <a:fillRef idx="0">
+            <a:schemeClr val="accent1"/>
+          </a:fillRef>
+          <a:effectRef idx="0">
+            <a:schemeClr val="accent1"/>
+          </a:effectRef>
+          <a:fontRef idx="minor">
+            <a:schemeClr val="tx1"/>
+          </a:fontRef>
+        </p:style>
+      </p:cxnSp>
+      <p:sp>
+        <p:nvSpPr>
+          <p:cNvPr id="41" name="직사각형 40">
+            <a:extLst>
+              <a:ext uri="{FF2B5EF4-FFF2-40B4-BE49-F238E27FC236}">
+                <a16:creationId xmlns:a16="http://schemas.microsoft.com/office/drawing/2014/main" id="{7E6495FE-EF86-407D-8DFB-4E7E4B6ADF44}"/>
+              </a:ext>
+            </a:extLst>
+          </p:cNvPr>
+          <p:cNvSpPr/>
+          <p:nvPr/>
+        </p:nvSpPr>
+        <p:spPr>
+          <a:xfrm>
+            <a:off x="10844591" y="3553097"/>
+            <a:ext cx="1196458" cy="552450"/>
+          </a:xfrm>
+          <a:prstGeom prst="rect">
+            <a:avLst/>
+          </a:prstGeom>
+          <a:ln w="38100">
+            <a:solidFill>
+              <a:schemeClr val="tx1"/>
+            </a:solidFill>
+          </a:ln>
+        </p:spPr>
+        <p:style>
+          <a:lnRef idx="2">
+            <a:schemeClr val="accent4">
+              <a:shade val="50000"/>
+            </a:schemeClr>
+          </a:lnRef>
+          <a:fillRef idx="1">
+            <a:schemeClr val="accent4"/>
+          </a:fillRef>
+          <a:effectRef idx="0">
+            <a:schemeClr val="accent4"/>
+          </a:effectRef>
+          <a:fontRef idx="minor">
+            <a:schemeClr val="lt1"/>
+          </a:fontRef>
+        </p:style>
+        <p:txBody>
+          <a:bodyPr rtlCol="0" anchor="ctr"/>
+          <a:lstStyle/>
+          <a:p>
+            <a:pPr algn="ctr"/>
+            <a:r>
+              <a:rPr lang="en-US" altLang="ko-KR" sz="1600" b="1" dirty="0" err="1">
+                <a:solidFill>
+                  <a:schemeClr val="tx1"/>
+                </a:solidFill>
+              </a:rPr>
+              <a:t>temp_reg</a:t>
+            </a:r>
+            <a:endParaRPr lang="ko-KR" altLang="en-US" sz="1600" b="1" dirty="0">
+              <a:solidFill>
+                <a:schemeClr val="tx1"/>
+              </a:solidFill>
+            </a:endParaRPr>
+          </a:p>
+        </p:txBody>
+      </p:sp>
+      <p:sp>
+        <p:nvSpPr>
+          <p:cNvPr id="53" name="직사각형 52">
+            <a:extLst>
+              <a:ext uri="{FF2B5EF4-FFF2-40B4-BE49-F238E27FC236}">
+                <a16:creationId xmlns:a16="http://schemas.microsoft.com/office/drawing/2014/main" id="{15151768-0099-4DB2-A1A1-2AED6DC51D63}"/>
+              </a:ext>
+            </a:extLst>
+          </p:cNvPr>
+          <p:cNvSpPr/>
+          <p:nvPr/>
+        </p:nvSpPr>
+        <p:spPr>
+          <a:xfrm>
+            <a:off x="2682627" y="5531171"/>
+            <a:ext cx="1522481" cy="655200"/>
+          </a:xfrm>
+          <a:prstGeom prst="rect">
+            <a:avLst/>
+          </a:prstGeom>
+        </p:spPr>
+        <p:style>
+          <a:lnRef idx="1">
+            <a:schemeClr val="accent6"/>
+          </a:lnRef>
+          <a:fillRef idx="2">
+            <a:schemeClr val="accent6"/>
+          </a:fillRef>
+          <a:effectRef idx="1">
+            <a:schemeClr val="accent6"/>
+          </a:effectRef>
+          <a:fontRef idx="minor">
+            <a:schemeClr val="dk1"/>
+          </a:fontRef>
+        </p:style>
+        <p:txBody>
+          <a:bodyPr rtlCol="0" anchor="ctr"/>
+          <a:lstStyle/>
+          <a:p>
+            <a:pPr algn="ctr"/>
+            <a:r>
+              <a:rPr lang="en-US" altLang="ko-KR" dirty="0" err="1"/>
+              <a:t>temp_reg</a:t>
+            </a:r>
+            <a:endParaRPr lang="en-US" altLang="ko-KR" dirty="0"/>
+          </a:p>
+          <a:p>
+            <a:pPr algn="ctr"/>
+            <a:r>
+              <a:rPr lang="en-US" altLang="ko-KR" dirty="0"/>
+              <a:t>(</a:t>
+            </a:r>
+            <a:r>
+              <a:rPr lang="en-US" altLang="ko-KR" dirty="0" err="1"/>
+              <a:t>uvm_reg</a:t>
+            </a:r>
+            <a:r>
+              <a:rPr lang="en-US" altLang="ko-KR" dirty="0"/>
+              <a:t>)</a:t>
+            </a:r>
+            <a:endParaRPr lang="ko-KR" altLang="en-US" dirty="0"/>
+          </a:p>
+        </p:txBody>
+      </p:sp>
+      <p:sp>
+        <p:nvSpPr>
+          <p:cNvPr id="54" name="직사각형 53">
+            <a:extLst>
+              <a:ext uri="{FF2B5EF4-FFF2-40B4-BE49-F238E27FC236}">
+                <a16:creationId xmlns:a16="http://schemas.microsoft.com/office/drawing/2014/main" id="{E91BDEE9-41EE-4094-8E83-0EC8FF3EBFD1}"/>
+              </a:ext>
+            </a:extLst>
+          </p:cNvPr>
+          <p:cNvSpPr/>
+          <p:nvPr/>
+        </p:nvSpPr>
+        <p:spPr>
+          <a:xfrm>
+            <a:off x="2682627" y="4162346"/>
+            <a:ext cx="2246811" cy="598405"/>
+          </a:xfrm>
+          <a:prstGeom prst="rect">
+            <a:avLst/>
+          </a:prstGeom>
+          <a:solidFill>
+            <a:srgbClr val="FFFFCC"/>
+          </a:solidFill>
+        </p:spPr>
+        <p:style>
+          <a:lnRef idx="2">
+            <a:schemeClr val="accent1">
+              <a:shade val="50000"/>
+            </a:schemeClr>
+          </a:lnRef>
+          <a:fillRef idx="1">
+            <a:schemeClr val="accent1"/>
+          </a:fillRef>
+          <a:effectRef idx="0">
+            <a:schemeClr val="accent1"/>
+          </a:effectRef>
+          <a:fontRef idx="minor">
+            <a:schemeClr val="lt1"/>
+          </a:fontRef>
+        </p:style>
+        <p:txBody>
+          <a:bodyPr rtlCol="0" anchor="ctr"/>
+          <a:lstStyle/>
+          <a:p>
+            <a:pPr algn="ctr"/>
+            <a:r>
+              <a:rPr lang="en-US" altLang="ko-KR" dirty="0">
+                <a:solidFill>
+                  <a:sysClr val="windowText" lastClr="000000"/>
+                </a:solidFill>
+              </a:rPr>
+              <a:t>reg2apb_adapter</a:t>
+            </a:r>
+            <a:endParaRPr lang="ko-KR" altLang="en-US" dirty="0">
+              <a:solidFill>
+                <a:sysClr val="windowText" lastClr="000000"/>
+              </a:solidFill>
+            </a:endParaRPr>
+          </a:p>
+        </p:txBody>
+      </p:sp>
+      <p:cxnSp>
+        <p:nvCxnSpPr>
+          <p:cNvPr id="43" name="연결선: 구부러짐 42">
+            <a:extLst>
+              <a:ext uri="{FF2B5EF4-FFF2-40B4-BE49-F238E27FC236}">
+                <a16:creationId xmlns:a16="http://schemas.microsoft.com/office/drawing/2014/main" id="{E11C445A-7BE8-4E8E-BB09-D40F3D24BE14}"/>
+              </a:ext>
+            </a:extLst>
+          </p:cNvPr>
+          <p:cNvCxnSpPr>
+            <a:stCxn id="38" idx="1"/>
+          </p:cNvCxnSpPr>
+          <p:nvPr/>
+        </p:nvCxnSpPr>
+        <p:spPr>
+          <a:xfrm rot="10800000">
+            <a:off x="2837303" y="3347072"/>
+            <a:ext cx="3012814" cy="2355285"/>
+          </a:xfrm>
+          <a:prstGeom prst="curvedConnector3">
+            <a:avLst>
+              <a:gd name="adj1" fmla="val 111649"/>
+            </a:avLst>
           </a:prstGeom>
           <a:ln w="28575">
             <a:solidFill>
@@ -4832,6 +5218,2203 @@
     <p:extLst>
       <p:ext uri="{BB962C8B-B14F-4D97-AF65-F5344CB8AC3E}">
         <p14:creationId xmlns:p14="http://schemas.microsoft.com/office/powerpoint/2010/main" val="1358850689"/>
+      </p:ext>
+    </p:extLst>
+  </p:cSld>
+  <p:clrMapOvr>
+    <a:masterClrMapping/>
+  </p:clrMapOvr>
+</p:sld>
+</file>
+
+<file path=ppt/slides/slide2.xml><?xml version="1.0" encoding="utf-8"?>
+<p:sld xmlns:a="http://schemas.openxmlformats.org/drawingml/2006/main" xmlns:r="http://schemas.openxmlformats.org/officeDocument/2006/relationships" xmlns:p="http://schemas.openxmlformats.org/presentationml/2006/main">
+  <p:cSld>
+    <p:spTree>
+      <p:nvGrpSpPr>
+        <p:cNvPr id="1" name=""/>
+        <p:cNvGrpSpPr/>
+        <p:nvPr/>
+      </p:nvGrpSpPr>
+      <p:grpSpPr>
+        <a:xfrm>
+          <a:off x="0" y="0"/>
+          <a:ext cx="0" cy="0"/>
+          <a:chOff x="0" y="0"/>
+          <a:chExt cx="0" cy="0"/>
+        </a:xfrm>
+      </p:grpSpPr>
+      <p:graphicFrame>
+        <p:nvGraphicFramePr>
+          <p:cNvPr id="2" name="표 2">
+            <a:extLst>
+              <a:ext uri="{FF2B5EF4-FFF2-40B4-BE49-F238E27FC236}">
+                <a16:creationId xmlns:a16="http://schemas.microsoft.com/office/drawing/2014/main" id="{AE511736-DD2A-4E97-BA6A-DF5F656CCA6C}"/>
+              </a:ext>
+            </a:extLst>
+          </p:cNvPr>
+          <p:cNvGraphicFramePr>
+            <a:graphicFrameLocks noGrp="1"/>
+          </p:cNvGraphicFramePr>
+          <p:nvPr>
+            <p:extLst>
+              <p:ext uri="{D42A27DB-BD31-4B8C-83A1-F6EECF244321}">
+                <p14:modId xmlns:p14="http://schemas.microsoft.com/office/powerpoint/2010/main" val="221196391"/>
+              </p:ext>
+            </p:extLst>
+          </p:nvPr>
+        </p:nvGraphicFramePr>
+        <p:xfrm>
+          <a:off x="2753454" y="2928021"/>
+          <a:ext cx="8128000" cy="989590"/>
+        </p:xfrm>
+        <a:graphic>
+          <a:graphicData uri="http://schemas.openxmlformats.org/drawingml/2006/table">
+            <a:tbl>
+              <a:tblPr firstRow="1" bandRow="1">
+                <a:tableStyleId>{5C22544A-7EE6-4342-B048-85BDC9FD1C3A}</a:tableStyleId>
+              </a:tblPr>
+              <a:tblGrid>
+                <a:gridCol w="2430943">
+                  <a:extLst>
+                    <a:ext uri="{9D8B030D-6E8A-4147-A177-3AD203B41FA5}">
+                      <a16:colId xmlns:a16="http://schemas.microsoft.com/office/drawing/2014/main" val="3066272021"/>
+                    </a:ext>
+                  </a:extLst>
+                </a:gridCol>
+                <a:gridCol w="5697057">
+                  <a:extLst>
+                    <a:ext uri="{9D8B030D-6E8A-4147-A177-3AD203B41FA5}">
+                      <a16:colId xmlns:a16="http://schemas.microsoft.com/office/drawing/2014/main" val="3032661647"/>
+                    </a:ext>
+                  </a:extLst>
+                </a:gridCol>
+              </a:tblGrid>
+              <a:tr h="989590">
+                <a:tc>
+                  <a:txBody>
+                    <a:bodyPr/>
+                    <a:lstStyle/>
+                    <a:p>
+                      <a:pPr algn="ctr" latinLnBrk="1"/>
+                      <a:r>
+                        <a:rPr lang="en-US" altLang="ko-KR" dirty="0"/>
+                        <a:t>Data_16</a:t>
+                      </a:r>
+                      <a:endParaRPr lang="ko-KR" altLang="en-US" dirty="0"/>
+                    </a:p>
+                  </a:txBody>
+                  <a:tcPr anchor="ctr">
+                    <a:solidFill>
+                      <a:schemeClr val="accent2"/>
+                    </a:solidFill>
+                  </a:tcPr>
+                </a:tc>
+                <a:tc>
+                  <a:txBody>
+                    <a:bodyPr/>
+                    <a:lstStyle/>
+                    <a:p>
+                      <a:pPr algn="ctr" latinLnBrk="1"/>
+                      <a:r>
+                        <a:rPr lang="en-US" altLang="ko-KR" dirty="0"/>
+                        <a:t>Data_32</a:t>
+                      </a:r>
+                      <a:endParaRPr lang="ko-KR" altLang="en-US" dirty="0"/>
+                    </a:p>
+                  </a:txBody>
+                  <a:tcPr anchor="ctr">
+                    <a:solidFill>
+                      <a:schemeClr val="accent6">
+                        <a:lumMod val="60000"/>
+                        <a:lumOff val="40000"/>
+                      </a:schemeClr>
+                    </a:solidFill>
+                  </a:tcPr>
+                </a:tc>
+                <a:extLst>
+                  <a:ext uri="{0D108BD9-81ED-4DB2-BD59-A6C34878D82A}">
+                    <a16:rowId xmlns:a16="http://schemas.microsoft.com/office/drawing/2014/main" val="3967766893"/>
+                  </a:ext>
+                </a:extLst>
+              </a:tr>
+            </a:tbl>
+          </a:graphicData>
+        </a:graphic>
+      </p:graphicFrame>
+      <p:sp>
+        <p:nvSpPr>
+          <p:cNvPr id="4" name="TextBox 3">
+            <a:extLst>
+              <a:ext uri="{FF2B5EF4-FFF2-40B4-BE49-F238E27FC236}">
+                <a16:creationId xmlns:a16="http://schemas.microsoft.com/office/drawing/2014/main" id="{EBF7BAF7-9BA5-4408-B818-E0A65555D67F}"/>
+              </a:ext>
+            </a:extLst>
+          </p:cNvPr>
+          <p:cNvSpPr txBox="1"/>
+          <p:nvPr/>
+        </p:nvSpPr>
+        <p:spPr>
+          <a:xfrm>
+            <a:off x="830511" y="3087149"/>
+            <a:ext cx="1787541" cy="954107"/>
+          </a:xfrm>
+          <a:prstGeom prst="rect">
+            <a:avLst/>
+          </a:prstGeom>
+          <a:noFill/>
+        </p:spPr>
+        <p:txBody>
+          <a:bodyPr wrap="none" rtlCol="0">
+            <a:spAutoFit/>
+          </a:bodyPr>
+          <a:lstStyle/>
+          <a:p>
+            <a:pPr algn="ctr"/>
+            <a:r>
+              <a:rPr lang="en-US" altLang="ko-KR" sz="2800" b="1" dirty="0" err="1"/>
+              <a:t>temp_reg</a:t>
+            </a:r>
+            <a:endParaRPr lang="en-US" altLang="ko-KR" sz="2800" b="1" dirty="0"/>
+          </a:p>
+          <a:p>
+            <a:pPr algn="ctr"/>
+            <a:r>
+              <a:rPr lang="en-US" altLang="ko-KR" sz="2800" b="1" dirty="0"/>
+              <a:t>(0x0)</a:t>
+            </a:r>
+            <a:endParaRPr lang="ko-KR" altLang="en-US" sz="2800" b="1" dirty="0"/>
+          </a:p>
+        </p:txBody>
+      </p:sp>
+      <p:sp>
+        <p:nvSpPr>
+          <p:cNvPr id="5" name="TextBox 4">
+            <a:extLst>
+              <a:ext uri="{FF2B5EF4-FFF2-40B4-BE49-F238E27FC236}">
+                <a16:creationId xmlns:a16="http://schemas.microsoft.com/office/drawing/2014/main" id="{9C017222-EC66-4D01-8B5D-878823B4EB79}"/>
+              </a:ext>
+            </a:extLst>
+          </p:cNvPr>
+          <p:cNvSpPr txBox="1"/>
+          <p:nvPr/>
+        </p:nvSpPr>
+        <p:spPr>
+          <a:xfrm>
+            <a:off x="10655270" y="2558689"/>
+            <a:ext cx="452368" cy="369332"/>
+          </a:xfrm>
+          <a:prstGeom prst="rect">
+            <a:avLst/>
+          </a:prstGeom>
+          <a:noFill/>
+        </p:spPr>
+        <p:txBody>
+          <a:bodyPr wrap="none" rtlCol="0">
+            <a:spAutoFit/>
+          </a:bodyPr>
+          <a:lstStyle/>
+          <a:p>
+            <a:r>
+              <a:rPr lang="en-US" altLang="ko-KR" dirty="0"/>
+              <a:t>[0]</a:t>
+            </a:r>
+            <a:endParaRPr lang="ko-KR" altLang="en-US" dirty="0"/>
+          </a:p>
+        </p:txBody>
+      </p:sp>
+      <p:sp>
+        <p:nvSpPr>
+          <p:cNvPr id="6" name="TextBox 5">
+            <a:extLst>
+              <a:ext uri="{FF2B5EF4-FFF2-40B4-BE49-F238E27FC236}">
+                <a16:creationId xmlns:a16="http://schemas.microsoft.com/office/drawing/2014/main" id="{2175D927-84B3-445A-A78D-3C759ED94DDC}"/>
+              </a:ext>
+            </a:extLst>
+          </p:cNvPr>
+          <p:cNvSpPr txBox="1"/>
+          <p:nvPr/>
+        </p:nvSpPr>
+        <p:spPr>
+          <a:xfrm>
+            <a:off x="4682310" y="2558689"/>
+            <a:ext cx="973343" cy="369332"/>
+          </a:xfrm>
+          <a:prstGeom prst="rect">
+            <a:avLst/>
+          </a:prstGeom>
+          <a:noFill/>
+        </p:spPr>
+        <p:txBody>
+          <a:bodyPr wrap="none" rtlCol="0">
+            <a:spAutoFit/>
+          </a:bodyPr>
+          <a:lstStyle/>
+          <a:p>
+            <a:r>
+              <a:rPr lang="en-US" altLang="ko-KR" dirty="0"/>
+              <a:t>[32][31]</a:t>
+            </a:r>
+            <a:endParaRPr lang="ko-KR" altLang="en-US" dirty="0"/>
+          </a:p>
+        </p:txBody>
+      </p:sp>
+      <p:sp>
+        <p:nvSpPr>
+          <p:cNvPr id="7" name="TextBox 6">
+            <a:extLst>
+              <a:ext uri="{FF2B5EF4-FFF2-40B4-BE49-F238E27FC236}">
+                <a16:creationId xmlns:a16="http://schemas.microsoft.com/office/drawing/2014/main" id="{3E47D48D-E41A-49CA-A2CC-8A185F7812F7}"/>
+              </a:ext>
+            </a:extLst>
+          </p:cNvPr>
+          <p:cNvSpPr txBox="1"/>
+          <p:nvPr/>
+        </p:nvSpPr>
+        <p:spPr>
+          <a:xfrm>
+            <a:off x="2463951" y="2558689"/>
+            <a:ext cx="579005" cy="369332"/>
+          </a:xfrm>
+          <a:prstGeom prst="rect">
+            <a:avLst/>
+          </a:prstGeom>
+          <a:noFill/>
+        </p:spPr>
+        <p:txBody>
+          <a:bodyPr wrap="none" rtlCol="0">
+            <a:spAutoFit/>
+          </a:bodyPr>
+          <a:lstStyle/>
+          <a:p>
+            <a:r>
+              <a:rPr lang="en-US" altLang="ko-KR" dirty="0"/>
+              <a:t>[47]</a:t>
+            </a:r>
+            <a:endParaRPr lang="ko-KR" altLang="en-US" dirty="0"/>
+          </a:p>
+        </p:txBody>
+      </p:sp>
+    </p:spTree>
+    <p:extLst>
+      <p:ext uri="{BB962C8B-B14F-4D97-AF65-F5344CB8AC3E}">
+        <p14:creationId xmlns:p14="http://schemas.microsoft.com/office/powerpoint/2010/main" val="1446123455"/>
+      </p:ext>
+    </p:extLst>
+  </p:cSld>
+  <p:clrMapOvr>
+    <a:masterClrMapping/>
+  </p:clrMapOvr>
+</p:sld>
+</file>
+
+<file path=ppt/slides/slide3.xml><?xml version="1.0" encoding="utf-8"?>
+<p:sld xmlns:a="http://schemas.openxmlformats.org/drawingml/2006/main" xmlns:r="http://schemas.openxmlformats.org/officeDocument/2006/relationships" xmlns:p="http://schemas.openxmlformats.org/presentationml/2006/main">
+  <p:cSld>
+    <p:spTree>
+      <p:nvGrpSpPr>
+        <p:cNvPr id="1" name=""/>
+        <p:cNvGrpSpPr/>
+        <p:nvPr/>
+      </p:nvGrpSpPr>
+      <p:grpSpPr>
+        <a:xfrm>
+          <a:off x="0" y="0"/>
+          <a:ext cx="0" cy="0"/>
+          <a:chOff x="0" y="0"/>
+          <a:chExt cx="0" cy="0"/>
+        </a:xfrm>
+      </p:grpSpPr>
+      <p:sp>
+        <p:nvSpPr>
+          <p:cNvPr id="2" name="직사각형 1">
+            <a:extLst>
+              <a:ext uri="{FF2B5EF4-FFF2-40B4-BE49-F238E27FC236}">
+                <a16:creationId xmlns:a16="http://schemas.microsoft.com/office/drawing/2014/main" id="{BE0B8B07-6491-447F-B0CD-351EC9AEC6B0}"/>
+              </a:ext>
+            </a:extLst>
+          </p:cNvPr>
+          <p:cNvSpPr/>
+          <p:nvPr/>
+        </p:nvSpPr>
+        <p:spPr>
+          <a:xfrm>
+            <a:off x="0" y="0"/>
+            <a:ext cx="12192000" cy="6858000"/>
+          </a:xfrm>
+          <a:prstGeom prst="rect">
+            <a:avLst/>
+          </a:prstGeom>
+          <a:solidFill>
+            <a:schemeClr val="bg1"/>
+          </a:solidFill>
+          <a:ln>
+            <a:solidFill>
+              <a:schemeClr val="tx1"/>
+            </a:solidFill>
+          </a:ln>
+        </p:spPr>
+        <p:style>
+          <a:lnRef idx="2">
+            <a:schemeClr val="accent1">
+              <a:shade val="50000"/>
+            </a:schemeClr>
+          </a:lnRef>
+          <a:fillRef idx="1">
+            <a:schemeClr val="accent1"/>
+          </a:fillRef>
+          <a:effectRef idx="0">
+            <a:schemeClr val="accent1"/>
+          </a:effectRef>
+          <a:fontRef idx="minor">
+            <a:schemeClr val="lt1"/>
+          </a:fontRef>
+        </p:style>
+        <p:txBody>
+          <a:bodyPr rtlCol="0" anchor="ctr"/>
+          <a:lstStyle/>
+          <a:p>
+            <a:pPr algn="ctr"/>
+            <a:endParaRPr lang="ko-KR" altLang="en-US" dirty="0"/>
+          </a:p>
+        </p:txBody>
+      </p:sp>
+      <p:sp>
+        <p:nvSpPr>
+          <p:cNvPr id="3" name="직사각형 2">
+            <a:extLst>
+              <a:ext uri="{FF2B5EF4-FFF2-40B4-BE49-F238E27FC236}">
+                <a16:creationId xmlns:a16="http://schemas.microsoft.com/office/drawing/2014/main" id="{BB4B4206-6113-423D-A564-30B263632EBE}"/>
+              </a:ext>
+            </a:extLst>
+          </p:cNvPr>
+          <p:cNvSpPr/>
+          <p:nvPr/>
+        </p:nvSpPr>
+        <p:spPr>
+          <a:xfrm>
+            <a:off x="282180" y="184667"/>
+            <a:ext cx="8358481" cy="6473308"/>
+          </a:xfrm>
+          <a:prstGeom prst="rect">
+            <a:avLst/>
+          </a:prstGeom>
+          <a:solidFill>
+            <a:srgbClr val="EEEAF2"/>
+          </a:solidFill>
+        </p:spPr>
+        <p:style>
+          <a:lnRef idx="2">
+            <a:schemeClr val="accent1">
+              <a:shade val="50000"/>
+            </a:schemeClr>
+          </a:lnRef>
+          <a:fillRef idx="1">
+            <a:schemeClr val="accent1"/>
+          </a:fillRef>
+          <a:effectRef idx="0">
+            <a:schemeClr val="accent1"/>
+          </a:effectRef>
+          <a:fontRef idx="minor">
+            <a:schemeClr val="lt1"/>
+          </a:fontRef>
+        </p:style>
+        <p:txBody>
+          <a:bodyPr rtlCol="0" anchor="ctr"/>
+          <a:lstStyle/>
+          <a:p>
+            <a:pPr algn="ctr"/>
+            <a:endParaRPr lang="ko-KR" altLang="en-US" dirty="0"/>
+          </a:p>
+        </p:txBody>
+      </p:sp>
+      <p:sp>
+        <p:nvSpPr>
+          <p:cNvPr id="4" name="TextBox 3">
+            <a:extLst>
+              <a:ext uri="{FF2B5EF4-FFF2-40B4-BE49-F238E27FC236}">
+                <a16:creationId xmlns:a16="http://schemas.microsoft.com/office/drawing/2014/main" id="{7209EED5-39D0-429B-A880-DE9A0CEEF1A9}"/>
+              </a:ext>
+            </a:extLst>
+          </p:cNvPr>
+          <p:cNvSpPr txBox="1"/>
+          <p:nvPr/>
+        </p:nvSpPr>
+        <p:spPr>
+          <a:xfrm>
+            <a:off x="309848" y="185813"/>
+            <a:ext cx="2545184" cy="369332"/>
+          </a:xfrm>
+          <a:prstGeom prst="rect">
+            <a:avLst/>
+          </a:prstGeom>
+          <a:noFill/>
+        </p:spPr>
+        <p:txBody>
+          <a:bodyPr wrap="none" rtlCol="0">
+            <a:spAutoFit/>
+          </a:bodyPr>
+          <a:lstStyle/>
+          <a:p>
+            <a:r>
+              <a:rPr lang="en-US" altLang="ko-KR" dirty="0" err="1"/>
+              <a:t>predictor_collision_test</a:t>
+            </a:r>
+            <a:endParaRPr lang="ko-KR" altLang="en-US" dirty="0"/>
+          </a:p>
+        </p:txBody>
+      </p:sp>
+      <p:sp>
+        <p:nvSpPr>
+          <p:cNvPr id="5" name="직사각형 4">
+            <a:extLst>
+              <a:ext uri="{FF2B5EF4-FFF2-40B4-BE49-F238E27FC236}">
+                <a16:creationId xmlns:a16="http://schemas.microsoft.com/office/drawing/2014/main" id="{6CF4BAF2-B86D-45EA-95CD-F61A685F3736}"/>
+              </a:ext>
+            </a:extLst>
+          </p:cNvPr>
+          <p:cNvSpPr/>
+          <p:nvPr/>
+        </p:nvSpPr>
+        <p:spPr>
+          <a:xfrm>
+            <a:off x="9543854" y="766207"/>
+            <a:ext cx="757238" cy="3591164"/>
+          </a:xfrm>
+          <a:prstGeom prst="rect">
+            <a:avLst/>
+          </a:prstGeom>
+          <a:solidFill>
+            <a:srgbClr val="FBD7BB"/>
+          </a:solidFill>
+        </p:spPr>
+        <p:style>
+          <a:lnRef idx="2">
+            <a:schemeClr val="accent1">
+              <a:shade val="50000"/>
+            </a:schemeClr>
+          </a:lnRef>
+          <a:fillRef idx="1">
+            <a:schemeClr val="accent1"/>
+          </a:fillRef>
+          <a:effectRef idx="0">
+            <a:schemeClr val="accent1"/>
+          </a:effectRef>
+          <a:fontRef idx="minor">
+            <a:schemeClr val="lt1"/>
+          </a:fontRef>
+        </p:style>
+        <p:txBody>
+          <a:bodyPr vert="vert270" rtlCol="0" anchor="ctr"/>
+          <a:lstStyle/>
+          <a:p>
+            <a:pPr algn="ctr"/>
+            <a:r>
+              <a:rPr lang="en-US" altLang="ko-KR" dirty="0" err="1">
+                <a:solidFill>
+                  <a:sysClr val="windowText" lastClr="000000"/>
+                </a:solidFill>
+              </a:rPr>
+              <a:t>apb_if</a:t>
+            </a:r>
+            <a:r>
+              <a:rPr lang="en-US" altLang="ko-KR" dirty="0">
+                <a:solidFill>
+                  <a:sysClr val="windowText" lastClr="000000"/>
+                </a:solidFill>
+              </a:rPr>
+              <a:t> (32-bit width)</a:t>
+            </a:r>
+            <a:endParaRPr lang="ko-KR" altLang="en-US" dirty="0">
+              <a:solidFill>
+                <a:sysClr val="windowText" lastClr="000000"/>
+              </a:solidFill>
+            </a:endParaRPr>
+          </a:p>
+        </p:txBody>
+      </p:sp>
+      <p:sp>
+        <p:nvSpPr>
+          <p:cNvPr id="6" name="직사각형 5">
+            <a:extLst>
+              <a:ext uri="{FF2B5EF4-FFF2-40B4-BE49-F238E27FC236}">
+                <a16:creationId xmlns:a16="http://schemas.microsoft.com/office/drawing/2014/main" id="{C730CF56-F868-4563-94B7-22B993E1782A}"/>
+              </a:ext>
+            </a:extLst>
+          </p:cNvPr>
+          <p:cNvSpPr/>
+          <p:nvPr/>
+        </p:nvSpPr>
+        <p:spPr>
+          <a:xfrm>
+            <a:off x="10777694" y="1142436"/>
+            <a:ext cx="1326359" cy="3278982"/>
+          </a:xfrm>
+          <a:prstGeom prst="rect">
+            <a:avLst/>
+          </a:prstGeom>
+          <a:solidFill>
+            <a:srgbClr val="7F7F7F"/>
+          </a:solidFill>
+        </p:spPr>
+        <p:style>
+          <a:lnRef idx="2">
+            <a:schemeClr val="accent1">
+              <a:shade val="50000"/>
+            </a:schemeClr>
+          </a:lnRef>
+          <a:fillRef idx="1">
+            <a:schemeClr val="accent1"/>
+          </a:fillRef>
+          <a:effectRef idx="0">
+            <a:schemeClr val="accent1"/>
+          </a:effectRef>
+          <a:fontRef idx="minor">
+            <a:schemeClr val="lt1"/>
+          </a:fontRef>
+        </p:style>
+        <p:txBody>
+          <a:bodyPr rtlCol="0" anchor="ctr"/>
+          <a:lstStyle/>
+          <a:p>
+            <a:pPr algn="ctr"/>
+            <a:r>
+              <a:rPr lang="en-US" altLang="ko-KR" dirty="0"/>
+              <a:t>design</a:t>
+            </a:r>
+            <a:endParaRPr lang="ko-KR" altLang="en-US" dirty="0"/>
+          </a:p>
+        </p:txBody>
+      </p:sp>
+      <p:grpSp>
+        <p:nvGrpSpPr>
+          <p:cNvPr id="7" name="그룹 6">
+            <a:extLst>
+              <a:ext uri="{FF2B5EF4-FFF2-40B4-BE49-F238E27FC236}">
+                <a16:creationId xmlns:a16="http://schemas.microsoft.com/office/drawing/2014/main" id="{D3B5AB75-6878-4A7F-B330-E6746EBD9F0D}"/>
+              </a:ext>
+            </a:extLst>
+          </p:cNvPr>
+          <p:cNvGrpSpPr/>
+          <p:nvPr/>
+        </p:nvGrpSpPr>
+        <p:grpSpPr>
+          <a:xfrm>
+            <a:off x="585786" y="574766"/>
+            <a:ext cx="7863305" cy="5956663"/>
+            <a:chOff x="585786" y="574766"/>
+            <a:chExt cx="8481465" cy="5956663"/>
+          </a:xfrm>
+        </p:grpSpPr>
+        <p:sp>
+          <p:nvSpPr>
+            <p:cNvPr id="8" name="직사각형 7">
+              <a:extLst>
+                <a:ext uri="{FF2B5EF4-FFF2-40B4-BE49-F238E27FC236}">
+                  <a16:creationId xmlns:a16="http://schemas.microsoft.com/office/drawing/2014/main" id="{71587A22-1F28-4BEE-AC1B-4827CF44AD7B}"/>
+                </a:ext>
+              </a:extLst>
+            </p:cNvPr>
+            <p:cNvSpPr/>
+            <p:nvPr/>
+          </p:nvSpPr>
+          <p:spPr>
+            <a:xfrm>
+              <a:off x="585786" y="574766"/>
+              <a:ext cx="8481465" cy="5956663"/>
+            </a:xfrm>
+            <a:prstGeom prst="rect">
+              <a:avLst/>
+            </a:prstGeom>
+            <a:solidFill>
+              <a:srgbClr val="FFFFFF"/>
+            </a:solidFill>
+          </p:spPr>
+          <p:style>
+            <a:lnRef idx="2">
+              <a:schemeClr val="accent1">
+                <a:shade val="50000"/>
+              </a:schemeClr>
+            </a:lnRef>
+            <a:fillRef idx="1">
+              <a:schemeClr val="accent1"/>
+            </a:fillRef>
+            <a:effectRef idx="0">
+              <a:schemeClr val="accent1"/>
+            </a:effectRef>
+            <a:fontRef idx="minor">
+              <a:schemeClr val="lt1"/>
+            </a:fontRef>
+          </p:style>
+          <p:txBody>
+            <a:bodyPr rtlCol="0" anchor="ctr"/>
+            <a:lstStyle/>
+            <a:p>
+              <a:pPr algn="ctr"/>
+              <a:endParaRPr lang="ko-KR" altLang="en-US"/>
+            </a:p>
+          </p:txBody>
+        </p:sp>
+        <p:sp>
+          <p:nvSpPr>
+            <p:cNvPr id="9" name="TextBox 8">
+              <a:extLst>
+                <a:ext uri="{FF2B5EF4-FFF2-40B4-BE49-F238E27FC236}">
+                  <a16:creationId xmlns:a16="http://schemas.microsoft.com/office/drawing/2014/main" id="{ADA59A25-A662-4D1A-906C-952838ED0B86}"/>
+                </a:ext>
+              </a:extLst>
+            </p:cNvPr>
+            <p:cNvSpPr txBox="1"/>
+            <p:nvPr/>
+          </p:nvSpPr>
+          <p:spPr>
+            <a:xfrm>
+              <a:off x="585788" y="578232"/>
+              <a:ext cx="968535" cy="369332"/>
+            </a:xfrm>
+            <a:prstGeom prst="rect">
+              <a:avLst/>
+            </a:prstGeom>
+            <a:noFill/>
+          </p:spPr>
+          <p:txBody>
+            <a:bodyPr wrap="none" rtlCol="0">
+              <a:spAutoFit/>
+            </a:bodyPr>
+            <a:lstStyle/>
+            <a:p>
+              <a:r>
+                <a:rPr lang="en-US" altLang="ko-KR" dirty="0" err="1"/>
+                <a:t>my_env</a:t>
+              </a:r>
+              <a:endParaRPr lang="ko-KR" altLang="en-US" dirty="0"/>
+            </a:p>
+          </p:txBody>
+        </p:sp>
+      </p:grpSp>
+      <p:sp>
+        <p:nvSpPr>
+          <p:cNvPr id="10" name="직사각형 9">
+            <a:extLst>
+              <a:ext uri="{FF2B5EF4-FFF2-40B4-BE49-F238E27FC236}">
+                <a16:creationId xmlns:a16="http://schemas.microsoft.com/office/drawing/2014/main" id="{18D30BCB-DD6C-4A71-9817-D3094A5CD156}"/>
+              </a:ext>
+            </a:extLst>
+          </p:cNvPr>
+          <p:cNvSpPr/>
+          <p:nvPr/>
+        </p:nvSpPr>
+        <p:spPr>
+          <a:xfrm>
+            <a:off x="1713017" y="2354165"/>
+            <a:ext cx="6485238" cy="1405545"/>
+          </a:xfrm>
+          <a:prstGeom prst="rect">
+            <a:avLst/>
+          </a:prstGeom>
+          <a:solidFill>
+            <a:srgbClr val="F2F2F2"/>
+          </a:solidFill>
+          <a:ln w="38100">
+            <a:solidFill>
+              <a:schemeClr val="tx1"/>
+            </a:solidFill>
+          </a:ln>
+        </p:spPr>
+        <p:style>
+          <a:lnRef idx="2">
+            <a:schemeClr val="accent1">
+              <a:shade val="50000"/>
+            </a:schemeClr>
+          </a:lnRef>
+          <a:fillRef idx="1">
+            <a:schemeClr val="accent1"/>
+          </a:fillRef>
+          <a:effectRef idx="0">
+            <a:schemeClr val="accent1"/>
+          </a:effectRef>
+          <a:fontRef idx="minor">
+            <a:schemeClr val="lt1"/>
+          </a:fontRef>
+        </p:style>
+        <p:txBody>
+          <a:bodyPr rtlCol="0" anchor="ctr"/>
+          <a:lstStyle/>
+          <a:p>
+            <a:pPr algn="ctr"/>
+            <a:endParaRPr lang="ko-KR" altLang="en-US" dirty="0"/>
+          </a:p>
+        </p:txBody>
+      </p:sp>
+      <p:sp>
+        <p:nvSpPr>
+          <p:cNvPr id="11" name="TextBox 10">
+            <a:extLst>
+              <a:ext uri="{FF2B5EF4-FFF2-40B4-BE49-F238E27FC236}">
+                <a16:creationId xmlns:a16="http://schemas.microsoft.com/office/drawing/2014/main" id="{DB5F39F2-5A40-456D-9642-BE0B35EA93D3}"/>
+              </a:ext>
+            </a:extLst>
+          </p:cNvPr>
+          <p:cNvSpPr txBox="1"/>
+          <p:nvPr/>
+        </p:nvSpPr>
+        <p:spPr>
+          <a:xfrm>
+            <a:off x="1768216" y="2365596"/>
+            <a:ext cx="1401346" cy="369332"/>
+          </a:xfrm>
+          <a:prstGeom prst="rect">
+            <a:avLst/>
+          </a:prstGeom>
+          <a:noFill/>
+        </p:spPr>
+        <p:txBody>
+          <a:bodyPr wrap="none" rtlCol="0">
+            <a:spAutoFit/>
+          </a:bodyPr>
+          <a:lstStyle/>
+          <a:p>
+            <a:r>
+              <a:rPr lang="en-US" altLang="ko-KR" dirty="0"/>
+              <a:t>apb_agent0</a:t>
+            </a:r>
+            <a:endParaRPr lang="ko-KR" altLang="en-US" dirty="0"/>
+          </a:p>
+        </p:txBody>
+      </p:sp>
+      <p:sp>
+        <p:nvSpPr>
+          <p:cNvPr id="12" name="직사각형 11">
+            <a:extLst>
+              <a:ext uri="{FF2B5EF4-FFF2-40B4-BE49-F238E27FC236}">
+                <a16:creationId xmlns:a16="http://schemas.microsoft.com/office/drawing/2014/main" id="{24D360BC-11E5-406D-8684-BFCB6D232956}"/>
+              </a:ext>
+            </a:extLst>
+          </p:cNvPr>
+          <p:cNvSpPr/>
+          <p:nvPr/>
+        </p:nvSpPr>
+        <p:spPr>
+          <a:xfrm>
+            <a:off x="6104531" y="2428670"/>
+            <a:ext cx="1711235" cy="523024"/>
+          </a:xfrm>
+          <a:prstGeom prst="rect">
+            <a:avLst/>
+          </a:prstGeom>
+          <a:solidFill>
+            <a:srgbClr val="3F3F3F"/>
+          </a:solidFill>
+        </p:spPr>
+        <p:style>
+          <a:lnRef idx="2">
+            <a:schemeClr val="accent1">
+              <a:shade val="50000"/>
+            </a:schemeClr>
+          </a:lnRef>
+          <a:fillRef idx="1">
+            <a:schemeClr val="accent1"/>
+          </a:fillRef>
+          <a:effectRef idx="0">
+            <a:schemeClr val="accent1"/>
+          </a:effectRef>
+          <a:fontRef idx="minor">
+            <a:schemeClr val="lt1"/>
+          </a:fontRef>
+        </p:style>
+        <p:txBody>
+          <a:bodyPr rtlCol="0" anchor="ctr"/>
+          <a:lstStyle/>
+          <a:p>
+            <a:pPr algn="ctr"/>
+            <a:r>
+              <a:rPr lang="en-US" altLang="ko-KR" dirty="0" err="1"/>
+              <a:t>my_driver</a:t>
+            </a:r>
+            <a:endParaRPr lang="ko-KR" altLang="en-US" dirty="0"/>
+          </a:p>
+        </p:txBody>
+      </p:sp>
+      <p:grpSp>
+        <p:nvGrpSpPr>
+          <p:cNvPr id="13" name="그룹 12">
+            <a:extLst>
+              <a:ext uri="{FF2B5EF4-FFF2-40B4-BE49-F238E27FC236}">
+                <a16:creationId xmlns:a16="http://schemas.microsoft.com/office/drawing/2014/main" id="{1F7BC99C-C3FD-4B7A-90BE-5C367839291C}"/>
+              </a:ext>
+            </a:extLst>
+          </p:cNvPr>
+          <p:cNvGrpSpPr/>
+          <p:nvPr/>
+        </p:nvGrpSpPr>
+        <p:grpSpPr>
+          <a:xfrm>
+            <a:off x="776360" y="3900880"/>
+            <a:ext cx="7421896" cy="2499919"/>
+            <a:chOff x="776359" y="2526895"/>
+            <a:chExt cx="8055221" cy="3873905"/>
+          </a:xfrm>
+        </p:grpSpPr>
+        <p:sp>
+          <p:nvSpPr>
+            <p:cNvPr id="14" name="직사각형 13">
+              <a:extLst>
+                <a:ext uri="{FF2B5EF4-FFF2-40B4-BE49-F238E27FC236}">
+                  <a16:creationId xmlns:a16="http://schemas.microsoft.com/office/drawing/2014/main" id="{4F8B64F3-8D58-49FD-BB43-DCF4DEF5CF96}"/>
+                </a:ext>
+              </a:extLst>
+            </p:cNvPr>
+            <p:cNvSpPr/>
+            <p:nvPr/>
+          </p:nvSpPr>
+          <p:spPr>
+            <a:xfrm>
+              <a:off x="776360" y="2537095"/>
+              <a:ext cx="8055220" cy="3863705"/>
+            </a:xfrm>
+            <a:prstGeom prst="rect">
+              <a:avLst/>
+            </a:prstGeom>
+            <a:solidFill>
+              <a:srgbClr val="F2F2F2"/>
+            </a:solidFill>
+            <a:ln w="38100">
+              <a:solidFill>
+                <a:schemeClr val="tx1"/>
+              </a:solidFill>
+            </a:ln>
+          </p:spPr>
+          <p:style>
+            <a:lnRef idx="2">
+              <a:schemeClr val="accent1">
+                <a:shade val="50000"/>
+              </a:schemeClr>
+            </a:lnRef>
+            <a:fillRef idx="1">
+              <a:schemeClr val="accent1"/>
+            </a:fillRef>
+            <a:effectRef idx="0">
+              <a:schemeClr val="accent1"/>
+            </a:effectRef>
+            <a:fontRef idx="minor">
+              <a:schemeClr val="lt1"/>
+            </a:fontRef>
+          </p:style>
+          <p:txBody>
+            <a:bodyPr rtlCol="0" anchor="ctr"/>
+            <a:lstStyle/>
+            <a:p>
+              <a:pPr algn="ctr"/>
+              <a:endParaRPr lang="ko-KR" altLang="en-US"/>
+            </a:p>
+          </p:txBody>
+        </p:sp>
+        <p:sp>
+          <p:nvSpPr>
+            <p:cNvPr id="15" name="TextBox 14">
+              <a:extLst>
+                <a:ext uri="{FF2B5EF4-FFF2-40B4-BE49-F238E27FC236}">
+                  <a16:creationId xmlns:a16="http://schemas.microsoft.com/office/drawing/2014/main" id="{C5A4203E-B600-48D2-9E47-A6D1FA7C48D7}"/>
+                </a:ext>
+              </a:extLst>
+            </p:cNvPr>
+            <p:cNvSpPr txBox="1"/>
+            <p:nvPr/>
+          </p:nvSpPr>
+          <p:spPr>
+            <a:xfrm>
+              <a:off x="776359" y="2526895"/>
+              <a:ext cx="1209652" cy="572321"/>
+            </a:xfrm>
+            <a:prstGeom prst="rect">
+              <a:avLst/>
+            </a:prstGeom>
+            <a:noFill/>
+          </p:spPr>
+          <p:txBody>
+            <a:bodyPr wrap="square" rtlCol="0">
+              <a:spAutoFit/>
+            </a:bodyPr>
+            <a:lstStyle/>
+            <a:p>
+              <a:r>
+                <a:rPr lang="en-US" altLang="ko-KR" b="1" dirty="0" err="1"/>
+                <a:t>reg_env</a:t>
+              </a:r>
+              <a:endParaRPr lang="ko-KR" altLang="en-US" b="1" dirty="0"/>
+            </a:p>
+          </p:txBody>
+        </p:sp>
+      </p:grpSp>
+      <p:grpSp>
+        <p:nvGrpSpPr>
+          <p:cNvPr id="16" name="그룹 15">
+            <a:extLst>
+              <a:ext uri="{FF2B5EF4-FFF2-40B4-BE49-F238E27FC236}">
+                <a16:creationId xmlns:a16="http://schemas.microsoft.com/office/drawing/2014/main" id="{E21144E8-B44F-40DA-8768-97F1558EA733}"/>
+              </a:ext>
+            </a:extLst>
+          </p:cNvPr>
+          <p:cNvGrpSpPr/>
+          <p:nvPr/>
+        </p:nvGrpSpPr>
+        <p:grpSpPr>
+          <a:xfrm>
+            <a:off x="880636" y="4924056"/>
+            <a:ext cx="6871512" cy="1359177"/>
+            <a:chOff x="880636" y="3792132"/>
+            <a:chExt cx="7790924" cy="2491102"/>
+          </a:xfrm>
+        </p:grpSpPr>
+        <p:sp>
+          <p:nvSpPr>
+            <p:cNvPr id="17" name="직사각형 16">
+              <a:extLst>
+                <a:ext uri="{FF2B5EF4-FFF2-40B4-BE49-F238E27FC236}">
+                  <a16:creationId xmlns:a16="http://schemas.microsoft.com/office/drawing/2014/main" id="{F04DDFBE-9165-4EA0-AE8D-D4CFD0BF1BC8}"/>
+                </a:ext>
+              </a:extLst>
+            </p:cNvPr>
+            <p:cNvSpPr/>
+            <p:nvPr/>
+          </p:nvSpPr>
+          <p:spPr>
+            <a:xfrm>
+              <a:off x="880636" y="3792132"/>
+              <a:ext cx="7790924" cy="2491102"/>
+            </a:xfrm>
+            <a:prstGeom prst="rect">
+              <a:avLst/>
+            </a:prstGeom>
+            <a:solidFill>
+              <a:schemeClr val="accent4">
+                <a:lumMod val="20000"/>
+                <a:lumOff val="80000"/>
+              </a:schemeClr>
+            </a:solidFill>
+          </p:spPr>
+          <p:style>
+            <a:lnRef idx="2">
+              <a:schemeClr val="accent1">
+                <a:shade val="50000"/>
+              </a:schemeClr>
+            </a:lnRef>
+            <a:fillRef idx="1">
+              <a:schemeClr val="accent1"/>
+            </a:fillRef>
+            <a:effectRef idx="0">
+              <a:schemeClr val="accent1"/>
+            </a:effectRef>
+            <a:fontRef idx="minor">
+              <a:schemeClr val="lt1"/>
+            </a:fontRef>
+          </p:style>
+          <p:txBody>
+            <a:bodyPr rtlCol="0" anchor="ctr"/>
+            <a:lstStyle/>
+            <a:p>
+              <a:pPr algn="ctr"/>
+              <a:endParaRPr lang="ko-KR" altLang="en-US"/>
+            </a:p>
+          </p:txBody>
+        </p:sp>
+        <p:sp>
+          <p:nvSpPr>
+            <p:cNvPr id="18" name="TextBox 17">
+              <a:extLst>
+                <a:ext uri="{FF2B5EF4-FFF2-40B4-BE49-F238E27FC236}">
+                  <a16:creationId xmlns:a16="http://schemas.microsoft.com/office/drawing/2014/main" id="{CC57F7E8-951C-48C0-8143-DC47D12FDBC4}"/>
+                </a:ext>
+              </a:extLst>
+            </p:cNvPr>
+            <p:cNvSpPr txBox="1"/>
+            <p:nvPr/>
+          </p:nvSpPr>
+          <p:spPr>
+            <a:xfrm>
+              <a:off x="901516" y="3792132"/>
+              <a:ext cx="1810506" cy="676912"/>
+            </a:xfrm>
+            <a:prstGeom prst="rect">
+              <a:avLst/>
+            </a:prstGeom>
+            <a:noFill/>
+          </p:spPr>
+          <p:txBody>
+            <a:bodyPr wrap="none" rtlCol="0">
+              <a:spAutoFit/>
+            </a:bodyPr>
+            <a:lstStyle/>
+            <a:p>
+              <a:r>
+                <a:rPr lang="en-US" altLang="ko-KR" dirty="0" err="1"/>
+                <a:t>my_reg_block</a:t>
+              </a:r>
+              <a:endParaRPr lang="ko-KR" altLang="en-US" dirty="0"/>
+            </a:p>
+          </p:txBody>
+        </p:sp>
+      </p:grpSp>
+      <p:sp>
+        <p:nvSpPr>
+          <p:cNvPr id="19" name="직사각형 18">
+            <a:extLst>
+              <a:ext uri="{FF2B5EF4-FFF2-40B4-BE49-F238E27FC236}">
+                <a16:creationId xmlns:a16="http://schemas.microsoft.com/office/drawing/2014/main" id="{ECCAC5F5-0AE8-496B-BB7D-7049FE0F39A5}"/>
+              </a:ext>
+            </a:extLst>
+          </p:cNvPr>
+          <p:cNvSpPr/>
+          <p:nvPr/>
+        </p:nvSpPr>
+        <p:spPr>
+          <a:xfrm>
+            <a:off x="6104531" y="3085559"/>
+            <a:ext cx="1711235" cy="523024"/>
+          </a:xfrm>
+          <a:prstGeom prst="rect">
+            <a:avLst/>
+          </a:prstGeom>
+          <a:solidFill>
+            <a:srgbClr val="548BD4"/>
+          </a:solidFill>
+        </p:spPr>
+        <p:style>
+          <a:lnRef idx="2">
+            <a:schemeClr val="accent1">
+              <a:shade val="50000"/>
+            </a:schemeClr>
+          </a:lnRef>
+          <a:fillRef idx="1">
+            <a:schemeClr val="accent1"/>
+          </a:fillRef>
+          <a:effectRef idx="0">
+            <a:schemeClr val="accent1"/>
+          </a:effectRef>
+          <a:fontRef idx="minor">
+            <a:schemeClr val="lt1"/>
+          </a:fontRef>
+        </p:style>
+        <p:txBody>
+          <a:bodyPr rtlCol="0" anchor="ctr"/>
+          <a:lstStyle/>
+          <a:p>
+            <a:pPr algn="ctr"/>
+            <a:r>
+              <a:rPr lang="en-US" altLang="ko-KR" dirty="0" err="1"/>
+              <a:t>my_monitor</a:t>
+            </a:r>
+            <a:endParaRPr lang="ko-KR" altLang="en-US" dirty="0"/>
+          </a:p>
+        </p:txBody>
+      </p:sp>
+      <p:sp>
+        <p:nvSpPr>
+          <p:cNvPr id="20" name="직사각형 19">
+            <a:extLst>
+              <a:ext uri="{FF2B5EF4-FFF2-40B4-BE49-F238E27FC236}">
+                <a16:creationId xmlns:a16="http://schemas.microsoft.com/office/drawing/2014/main" id="{0C1B34AE-39FF-4C97-916B-58A5BA134A01}"/>
+              </a:ext>
+            </a:extLst>
+          </p:cNvPr>
+          <p:cNvSpPr/>
+          <p:nvPr/>
+        </p:nvSpPr>
+        <p:spPr>
+          <a:xfrm>
+            <a:off x="5505337" y="4184481"/>
+            <a:ext cx="2246811" cy="598405"/>
+          </a:xfrm>
+          <a:prstGeom prst="rect">
+            <a:avLst/>
+          </a:prstGeom>
+          <a:solidFill>
+            <a:srgbClr val="FFFFCC"/>
+          </a:solidFill>
+        </p:spPr>
+        <p:style>
+          <a:lnRef idx="2">
+            <a:schemeClr val="accent1">
+              <a:shade val="50000"/>
+            </a:schemeClr>
+          </a:lnRef>
+          <a:fillRef idx="1">
+            <a:schemeClr val="accent1"/>
+          </a:fillRef>
+          <a:effectRef idx="0">
+            <a:schemeClr val="accent1"/>
+          </a:effectRef>
+          <a:fontRef idx="minor">
+            <a:schemeClr val="lt1"/>
+          </a:fontRef>
+        </p:style>
+        <p:txBody>
+          <a:bodyPr rtlCol="0" anchor="ctr"/>
+          <a:lstStyle/>
+          <a:p>
+            <a:pPr algn="ctr"/>
+            <a:r>
+              <a:rPr lang="en-US" altLang="ko-KR" dirty="0" err="1">
+                <a:solidFill>
+                  <a:sysClr val="windowText" lastClr="000000"/>
+                </a:solidFill>
+              </a:rPr>
+              <a:t>uvm_reg_predictor</a:t>
+            </a:r>
+            <a:endParaRPr lang="ko-KR" altLang="en-US" dirty="0">
+              <a:solidFill>
+                <a:sysClr val="windowText" lastClr="000000"/>
+              </a:solidFill>
+            </a:endParaRPr>
+          </a:p>
+        </p:txBody>
+      </p:sp>
+      <p:sp>
+        <p:nvSpPr>
+          <p:cNvPr id="21" name="직사각형 20">
+            <a:extLst>
+              <a:ext uri="{FF2B5EF4-FFF2-40B4-BE49-F238E27FC236}">
+                <a16:creationId xmlns:a16="http://schemas.microsoft.com/office/drawing/2014/main" id="{D86F2C5C-4763-4F94-9DB3-61EA925C4E21}"/>
+              </a:ext>
+            </a:extLst>
+          </p:cNvPr>
+          <p:cNvSpPr/>
+          <p:nvPr/>
+        </p:nvSpPr>
+        <p:spPr>
+          <a:xfrm>
+            <a:off x="2837303" y="3070603"/>
+            <a:ext cx="2092135" cy="559754"/>
+          </a:xfrm>
+          <a:prstGeom prst="rect">
+            <a:avLst/>
+          </a:prstGeom>
+          <a:solidFill>
+            <a:srgbClr val="AA6862"/>
+          </a:solidFill>
+        </p:spPr>
+        <p:style>
+          <a:lnRef idx="2">
+            <a:schemeClr val="accent1">
+              <a:shade val="50000"/>
+            </a:schemeClr>
+          </a:lnRef>
+          <a:fillRef idx="1">
+            <a:schemeClr val="accent1"/>
+          </a:fillRef>
+          <a:effectRef idx="0">
+            <a:schemeClr val="accent1"/>
+          </a:effectRef>
+          <a:fontRef idx="minor">
+            <a:schemeClr val="lt1"/>
+          </a:fontRef>
+        </p:style>
+        <p:txBody>
+          <a:bodyPr rtlCol="0" anchor="ctr"/>
+          <a:lstStyle/>
+          <a:p>
+            <a:pPr algn="ctr"/>
+            <a:r>
+              <a:rPr lang="en-US" altLang="ko-KR" dirty="0" err="1"/>
+              <a:t>uvm_sequencer</a:t>
+            </a:r>
+            <a:endParaRPr lang="ko-KR" altLang="en-US" dirty="0"/>
+          </a:p>
+        </p:txBody>
+      </p:sp>
+      <p:sp>
+        <p:nvSpPr>
+          <p:cNvPr id="22" name="직사각형 21">
+            <a:extLst>
+              <a:ext uri="{FF2B5EF4-FFF2-40B4-BE49-F238E27FC236}">
+                <a16:creationId xmlns:a16="http://schemas.microsoft.com/office/drawing/2014/main" id="{15A56DB2-8461-4D8A-9093-E22694C86344}"/>
+              </a:ext>
+            </a:extLst>
+          </p:cNvPr>
+          <p:cNvSpPr/>
+          <p:nvPr/>
+        </p:nvSpPr>
+        <p:spPr>
+          <a:xfrm>
+            <a:off x="5850117" y="5222741"/>
+            <a:ext cx="1557249" cy="959230"/>
+          </a:xfrm>
+          <a:prstGeom prst="rect">
+            <a:avLst/>
+          </a:prstGeom>
+          <a:solidFill>
+            <a:srgbClr val="CCCCFF"/>
+          </a:solidFill>
+          <a:ln>
+            <a:solidFill>
+              <a:schemeClr val="tx1"/>
+            </a:solidFill>
+          </a:ln>
+        </p:spPr>
+        <p:style>
+          <a:lnRef idx="1">
+            <a:schemeClr val="accent6"/>
+          </a:lnRef>
+          <a:fillRef idx="2">
+            <a:schemeClr val="accent6"/>
+          </a:fillRef>
+          <a:effectRef idx="1">
+            <a:schemeClr val="accent6"/>
+          </a:effectRef>
+          <a:fontRef idx="minor">
+            <a:schemeClr val="dk1"/>
+          </a:fontRef>
+        </p:style>
+        <p:txBody>
+          <a:bodyPr rtlCol="0" anchor="ctr"/>
+          <a:lstStyle/>
+          <a:p>
+            <a:pPr algn="ctr"/>
+            <a:r>
+              <a:rPr lang="en-US" altLang="ko-KR" dirty="0" err="1"/>
+              <a:t>default_map</a:t>
+            </a:r>
+            <a:endParaRPr lang="en-US" altLang="ko-KR" dirty="0"/>
+          </a:p>
+        </p:txBody>
+      </p:sp>
+      <p:cxnSp>
+        <p:nvCxnSpPr>
+          <p:cNvPr id="23" name="직선 화살표 연결선 22">
+            <a:extLst>
+              <a:ext uri="{FF2B5EF4-FFF2-40B4-BE49-F238E27FC236}">
+                <a16:creationId xmlns:a16="http://schemas.microsoft.com/office/drawing/2014/main" id="{ABF4C4E9-5149-4A3D-A15C-5C5D7A2F2337}"/>
+              </a:ext>
+            </a:extLst>
+          </p:cNvPr>
+          <p:cNvCxnSpPr>
+            <a:cxnSpLocks/>
+          </p:cNvCxnSpPr>
+          <p:nvPr/>
+        </p:nvCxnSpPr>
+        <p:spPr>
+          <a:xfrm>
+            <a:off x="10301092" y="2239338"/>
+            <a:ext cx="494425" cy="0"/>
+          </a:xfrm>
+          <a:prstGeom prst="straightConnector1">
+            <a:avLst/>
+          </a:prstGeom>
+          <a:ln w="28575">
+            <a:solidFill>
+              <a:schemeClr val="tx1"/>
+            </a:solidFill>
+            <a:tailEnd type="triangle"/>
+          </a:ln>
+        </p:spPr>
+        <p:style>
+          <a:lnRef idx="1">
+            <a:schemeClr val="accent1"/>
+          </a:lnRef>
+          <a:fillRef idx="0">
+            <a:schemeClr val="accent1"/>
+          </a:fillRef>
+          <a:effectRef idx="0">
+            <a:schemeClr val="accent1"/>
+          </a:effectRef>
+          <a:fontRef idx="minor">
+            <a:schemeClr val="tx1"/>
+          </a:fontRef>
+        </p:style>
+      </p:cxnSp>
+      <p:cxnSp>
+        <p:nvCxnSpPr>
+          <p:cNvPr id="24" name="직선 화살표 연결선 23">
+            <a:extLst>
+              <a:ext uri="{FF2B5EF4-FFF2-40B4-BE49-F238E27FC236}">
+                <a16:creationId xmlns:a16="http://schemas.microsoft.com/office/drawing/2014/main" id="{ADD20859-5EDE-4B72-B789-01398067FE18}"/>
+              </a:ext>
+            </a:extLst>
+          </p:cNvPr>
+          <p:cNvCxnSpPr>
+            <a:cxnSpLocks/>
+          </p:cNvCxnSpPr>
+          <p:nvPr/>
+        </p:nvCxnSpPr>
+        <p:spPr>
+          <a:xfrm flipH="1">
+            <a:off x="10301092" y="2896227"/>
+            <a:ext cx="476602" cy="0"/>
+          </a:xfrm>
+          <a:prstGeom prst="straightConnector1">
+            <a:avLst/>
+          </a:prstGeom>
+          <a:ln w="28575">
+            <a:solidFill>
+              <a:schemeClr val="tx1"/>
+            </a:solidFill>
+            <a:tailEnd type="triangle"/>
+          </a:ln>
+        </p:spPr>
+        <p:style>
+          <a:lnRef idx="1">
+            <a:schemeClr val="accent1"/>
+          </a:lnRef>
+          <a:fillRef idx="0">
+            <a:schemeClr val="accent1"/>
+          </a:fillRef>
+          <a:effectRef idx="0">
+            <a:schemeClr val="accent1"/>
+          </a:effectRef>
+          <a:fontRef idx="minor">
+            <a:schemeClr val="tx1"/>
+          </a:fontRef>
+        </p:style>
+      </p:cxnSp>
+      <p:cxnSp>
+        <p:nvCxnSpPr>
+          <p:cNvPr id="25" name="직선 화살표 연결선 24">
+            <a:extLst>
+              <a:ext uri="{FF2B5EF4-FFF2-40B4-BE49-F238E27FC236}">
+                <a16:creationId xmlns:a16="http://schemas.microsoft.com/office/drawing/2014/main" id="{E45F9B14-4504-406C-9CCD-455271B1FD39}"/>
+              </a:ext>
+            </a:extLst>
+          </p:cNvPr>
+          <p:cNvCxnSpPr>
+            <a:cxnSpLocks/>
+            <a:endCxn id="12" idx="1"/>
+          </p:cNvCxnSpPr>
+          <p:nvPr/>
+        </p:nvCxnSpPr>
+        <p:spPr>
+          <a:xfrm flipV="1">
+            <a:off x="4931027" y="2690182"/>
+            <a:ext cx="1173504" cy="656890"/>
+          </a:xfrm>
+          <a:prstGeom prst="straightConnector1">
+            <a:avLst/>
+          </a:prstGeom>
+          <a:ln w="28575">
+            <a:solidFill>
+              <a:schemeClr val="tx1"/>
+            </a:solidFill>
+            <a:tailEnd type="triangle"/>
+          </a:ln>
+        </p:spPr>
+        <p:style>
+          <a:lnRef idx="1">
+            <a:schemeClr val="accent1"/>
+          </a:lnRef>
+          <a:fillRef idx="0">
+            <a:schemeClr val="accent1"/>
+          </a:fillRef>
+          <a:effectRef idx="0">
+            <a:schemeClr val="accent1"/>
+          </a:effectRef>
+          <a:fontRef idx="minor">
+            <a:schemeClr val="tx1"/>
+          </a:fontRef>
+        </p:style>
+      </p:cxnSp>
+      <p:sp>
+        <p:nvSpPr>
+          <p:cNvPr id="26" name="직사각형 25">
+            <a:extLst>
+              <a:ext uri="{FF2B5EF4-FFF2-40B4-BE49-F238E27FC236}">
+                <a16:creationId xmlns:a16="http://schemas.microsoft.com/office/drawing/2014/main" id="{24679289-3D5A-4BC3-A6FA-F3BF6E463027}"/>
+              </a:ext>
+            </a:extLst>
+          </p:cNvPr>
+          <p:cNvSpPr/>
+          <p:nvPr/>
+        </p:nvSpPr>
+        <p:spPr>
+          <a:xfrm>
+            <a:off x="1713017" y="761693"/>
+            <a:ext cx="6485238" cy="1405545"/>
+          </a:xfrm>
+          <a:prstGeom prst="rect">
+            <a:avLst/>
+          </a:prstGeom>
+          <a:solidFill>
+            <a:srgbClr val="F2F2F2"/>
+          </a:solidFill>
+          <a:ln w="38100">
+            <a:solidFill>
+              <a:schemeClr val="tx1"/>
+            </a:solidFill>
+          </a:ln>
+        </p:spPr>
+        <p:style>
+          <a:lnRef idx="2">
+            <a:schemeClr val="accent1">
+              <a:shade val="50000"/>
+            </a:schemeClr>
+          </a:lnRef>
+          <a:fillRef idx="1">
+            <a:schemeClr val="accent1"/>
+          </a:fillRef>
+          <a:effectRef idx="0">
+            <a:schemeClr val="accent1"/>
+          </a:effectRef>
+          <a:fontRef idx="minor">
+            <a:schemeClr val="lt1"/>
+          </a:fontRef>
+        </p:style>
+        <p:txBody>
+          <a:bodyPr rtlCol="0" anchor="ctr"/>
+          <a:lstStyle/>
+          <a:p>
+            <a:pPr algn="ctr"/>
+            <a:endParaRPr lang="ko-KR" altLang="en-US" dirty="0"/>
+          </a:p>
+        </p:txBody>
+      </p:sp>
+      <p:sp>
+        <p:nvSpPr>
+          <p:cNvPr id="27" name="TextBox 26">
+            <a:extLst>
+              <a:ext uri="{FF2B5EF4-FFF2-40B4-BE49-F238E27FC236}">
+                <a16:creationId xmlns:a16="http://schemas.microsoft.com/office/drawing/2014/main" id="{B1797D74-29A4-4CBD-9BA8-4EE1D6843E56}"/>
+              </a:ext>
+            </a:extLst>
+          </p:cNvPr>
+          <p:cNvSpPr txBox="1"/>
+          <p:nvPr/>
+        </p:nvSpPr>
+        <p:spPr>
+          <a:xfrm>
+            <a:off x="1768216" y="773124"/>
+            <a:ext cx="1401346" cy="369332"/>
+          </a:xfrm>
+          <a:prstGeom prst="rect">
+            <a:avLst/>
+          </a:prstGeom>
+          <a:noFill/>
+        </p:spPr>
+        <p:txBody>
+          <a:bodyPr wrap="none" rtlCol="0">
+            <a:spAutoFit/>
+          </a:bodyPr>
+          <a:lstStyle/>
+          <a:p>
+            <a:r>
+              <a:rPr lang="en-US" altLang="ko-KR" dirty="0"/>
+              <a:t>apb_agent1</a:t>
+            </a:r>
+            <a:endParaRPr lang="ko-KR" altLang="en-US" dirty="0"/>
+          </a:p>
+        </p:txBody>
+      </p:sp>
+      <p:sp>
+        <p:nvSpPr>
+          <p:cNvPr id="28" name="직사각형 27">
+            <a:extLst>
+              <a:ext uri="{FF2B5EF4-FFF2-40B4-BE49-F238E27FC236}">
+                <a16:creationId xmlns:a16="http://schemas.microsoft.com/office/drawing/2014/main" id="{8F5CEB08-A960-48C5-AD13-BBAA445A6A64}"/>
+              </a:ext>
+            </a:extLst>
+          </p:cNvPr>
+          <p:cNvSpPr/>
+          <p:nvPr/>
+        </p:nvSpPr>
+        <p:spPr>
+          <a:xfrm>
+            <a:off x="6104531" y="836198"/>
+            <a:ext cx="1711235" cy="523024"/>
+          </a:xfrm>
+          <a:prstGeom prst="rect">
+            <a:avLst/>
+          </a:prstGeom>
+          <a:solidFill>
+            <a:srgbClr val="3F3F3F"/>
+          </a:solidFill>
+        </p:spPr>
+        <p:style>
+          <a:lnRef idx="2">
+            <a:schemeClr val="accent1">
+              <a:shade val="50000"/>
+            </a:schemeClr>
+          </a:lnRef>
+          <a:fillRef idx="1">
+            <a:schemeClr val="accent1"/>
+          </a:fillRef>
+          <a:effectRef idx="0">
+            <a:schemeClr val="accent1"/>
+          </a:effectRef>
+          <a:fontRef idx="minor">
+            <a:schemeClr val="lt1"/>
+          </a:fontRef>
+        </p:style>
+        <p:txBody>
+          <a:bodyPr rtlCol="0" anchor="ctr"/>
+          <a:lstStyle/>
+          <a:p>
+            <a:pPr algn="ctr"/>
+            <a:r>
+              <a:rPr lang="en-US" altLang="ko-KR" dirty="0" err="1"/>
+              <a:t>my_driver</a:t>
+            </a:r>
+            <a:endParaRPr lang="ko-KR" altLang="en-US" dirty="0"/>
+          </a:p>
+        </p:txBody>
+      </p:sp>
+      <p:sp>
+        <p:nvSpPr>
+          <p:cNvPr id="29" name="직사각형 28">
+            <a:extLst>
+              <a:ext uri="{FF2B5EF4-FFF2-40B4-BE49-F238E27FC236}">
+                <a16:creationId xmlns:a16="http://schemas.microsoft.com/office/drawing/2014/main" id="{782B42D0-0749-4996-9724-27635E6D5D29}"/>
+              </a:ext>
+            </a:extLst>
+          </p:cNvPr>
+          <p:cNvSpPr/>
+          <p:nvPr/>
+        </p:nvSpPr>
+        <p:spPr>
+          <a:xfrm>
+            <a:off x="6104531" y="1493087"/>
+            <a:ext cx="1711235" cy="523024"/>
+          </a:xfrm>
+          <a:prstGeom prst="rect">
+            <a:avLst/>
+          </a:prstGeom>
+          <a:solidFill>
+            <a:srgbClr val="548BD4"/>
+          </a:solidFill>
+        </p:spPr>
+        <p:style>
+          <a:lnRef idx="2">
+            <a:schemeClr val="accent1">
+              <a:shade val="50000"/>
+            </a:schemeClr>
+          </a:lnRef>
+          <a:fillRef idx="1">
+            <a:schemeClr val="accent1"/>
+          </a:fillRef>
+          <a:effectRef idx="0">
+            <a:schemeClr val="accent1"/>
+          </a:effectRef>
+          <a:fontRef idx="minor">
+            <a:schemeClr val="lt1"/>
+          </a:fontRef>
+        </p:style>
+        <p:txBody>
+          <a:bodyPr rtlCol="0" anchor="ctr"/>
+          <a:lstStyle/>
+          <a:p>
+            <a:pPr algn="ctr"/>
+            <a:r>
+              <a:rPr lang="en-US" altLang="ko-KR" dirty="0" err="1"/>
+              <a:t>my_monitor</a:t>
+            </a:r>
+            <a:endParaRPr lang="ko-KR" altLang="en-US" dirty="0"/>
+          </a:p>
+        </p:txBody>
+      </p:sp>
+      <p:sp>
+        <p:nvSpPr>
+          <p:cNvPr id="30" name="직사각형 29">
+            <a:extLst>
+              <a:ext uri="{FF2B5EF4-FFF2-40B4-BE49-F238E27FC236}">
+                <a16:creationId xmlns:a16="http://schemas.microsoft.com/office/drawing/2014/main" id="{9663420F-33E7-4749-A74B-F6DD888C9A6B}"/>
+              </a:ext>
+            </a:extLst>
+          </p:cNvPr>
+          <p:cNvSpPr/>
+          <p:nvPr/>
+        </p:nvSpPr>
+        <p:spPr>
+          <a:xfrm>
+            <a:off x="2837303" y="1478131"/>
+            <a:ext cx="2092135" cy="559754"/>
+          </a:xfrm>
+          <a:prstGeom prst="rect">
+            <a:avLst/>
+          </a:prstGeom>
+          <a:solidFill>
+            <a:srgbClr val="AA6862"/>
+          </a:solidFill>
+        </p:spPr>
+        <p:style>
+          <a:lnRef idx="2">
+            <a:schemeClr val="accent1">
+              <a:shade val="50000"/>
+            </a:schemeClr>
+          </a:lnRef>
+          <a:fillRef idx="1">
+            <a:schemeClr val="accent1"/>
+          </a:fillRef>
+          <a:effectRef idx="0">
+            <a:schemeClr val="accent1"/>
+          </a:effectRef>
+          <a:fontRef idx="minor">
+            <a:schemeClr val="lt1"/>
+          </a:fontRef>
+        </p:style>
+        <p:txBody>
+          <a:bodyPr rtlCol="0" anchor="ctr"/>
+          <a:lstStyle/>
+          <a:p>
+            <a:pPr algn="ctr"/>
+            <a:r>
+              <a:rPr lang="en-US" altLang="ko-KR" dirty="0" err="1"/>
+              <a:t>uvm_sequencer</a:t>
+            </a:r>
+            <a:endParaRPr lang="ko-KR" altLang="en-US" dirty="0"/>
+          </a:p>
+        </p:txBody>
+      </p:sp>
+      <p:cxnSp>
+        <p:nvCxnSpPr>
+          <p:cNvPr id="31" name="직선 화살표 연결선 30">
+            <a:extLst>
+              <a:ext uri="{FF2B5EF4-FFF2-40B4-BE49-F238E27FC236}">
+                <a16:creationId xmlns:a16="http://schemas.microsoft.com/office/drawing/2014/main" id="{A6041371-FDF6-4FFB-936C-674AEB29393F}"/>
+              </a:ext>
+            </a:extLst>
+          </p:cNvPr>
+          <p:cNvCxnSpPr>
+            <a:cxnSpLocks/>
+          </p:cNvCxnSpPr>
+          <p:nvPr/>
+        </p:nvCxnSpPr>
+        <p:spPr>
+          <a:xfrm flipV="1">
+            <a:off x="4931027" y="1079101"/>
+            <a:ext cx="1173504" cy="656890"/>
+          </a:xfrm>
+          <a:prstGeom prst="straightConnector1">
+            <a:avLst/>
+          </a:prstGeom>
+          <a:ln w="28575">
+            <a:solidFill>
+              <a:schemeClr val="tx1"/>
+            </a:solidFill>
+            <a:tailEnd type="triangle"/>
+          </a:ln>
+        </p:spPr>
+        <p:style>
+          <a:lnRef idx="1">
+            <a:schemeClr val="accent1"/>
+          </a:lnRef>
+          <a:fillRef idx="0">
+            <a:schemeClr val="accent1"/>
+          </a:fillRef>
+          <a:effectRef idx="0">
+            <a:schemeClr val="accent1"/>
+          </a:effectRef>
+          <a:fontRef idx="minor">
+            <a:schemeClr val="tx1"/>
+          </a:fontRef>
+        </p:style>
+      </p:cxnSp>
+      <p:cxnSp>
+        <p:nvCxnSpPr>
+          <p:cNvPr id="32" name="직선 화살표 연결선 31">
+            <a:extLst>
+              <a:ext uri="{FF2B5EF4-FFF2-40B4-BE49-F238E27FC236}">
+                <a16:creationId xmlns:a16="http://schemas.microsoft.com/office/drawing/2014/main" id="{C9015480-CFCC-451C-863D-6F78CECDB57E}"/>
+              </a:ext>
+            </a:extLst>
+          </p:cNvPr>
+          <p:cNvCxnSpPr>
+            <a:stCxn id="28" idx="3"/>
+          </p:cNvCxnSpPr>
+          <p:nvPr/>
+        </p:nvCxnSpPr>
+        <p:spPr>
+          <a:xfrm>
+            <a:off x="7815766" y="1097710"/>
+            <a:ext cx="1728088" cy="0"/>
+          </a:xfrm>
+          <a:prstGeom prst="straightConnector1">
+            <a:avLst/>
+          </a:prstGeom>
+          <a:ln w="28575">
+            <a:solidFill>
+              <a:schemeClr val="tx1"/>
+            </a:solidFill>
+            <a:tailEnd type="triangle"/>
+          </a:ln>
+        </p:spPr>
+        <p:style>
+          <a:lnRef idx="1">
+            <a:schemeClr val="accent1"/>
+          </a:lnRef>
+          <a:fillRef idx="0">
+            <a:schemeClr val="accent1"/>
+          </a:fillRef>
+          <a:effectRef idx="0">
+            <a:schemeClr val="accent1"/>
+          </a:effectRef>
+          <a:fontRef idx="minor">
+            <a:schemeClr val="tx1"/>
+          </a:fontRef>
+        </p:style>
+      </p:cxnSp>
+      <p:cxnSp>
+        <p:nvCxnSpPr>
+          <p:cNvPr id="33" name="직선 화살표 연결선 32">
+            <a:extLst>
+              <a:ext uri="{FF2B5EF4-FFF2-40B4-BE49-F238E27FC236}">
+                <a16:creationId xmlns:a16="http://schemas.microsoft.com/office/drawing/2014/main" id="{6EC8FD6E-585A-47DF-B2E7-4815300D6062}"/>
+              </a:ext>
+            </a:extLst>
+          </p:cNvPr>
+          <p:cNvCxnSpPr>
+            <a:stCxn id="12" idx="3"/>
+          </p:cNvCxnSpPr>
+          <p:nvPr/>
+        </p:nvCxnSpPr>
+        <p:spPr>
+          <a:xfrm>
+            <a:off x="7815766" y="2690182"/>
+            <a:ext cx="1728088" cy="0"/>
+          </a:xfrm>
+          <a:prstGeom prst="straightConnector1">
+            <a:avLst/>
+          </a:prstGeom>
+          <a:ln w="28575">
+            <a:solidFill>
+              <a:schemeClr val="tx1"/>
+            </a:solidFill>
+            <a:tailEnd type="triangle"/>
+          </a:ln>
+        </p:spPr>
+        <p:style>
+          <a:lnRef idx="1">
+            <a:schemeClr val="accent1"/>
+          </a:lnRef>
+          <a:fillRef idx="0">
+            <a:schemeClr val="accent1"/>
+          </a:fillRef>
+          <a:effectRef idx="0">
+            <a:schemeClr val="accent1"/>
+          </a:effectRef>
+          <a:fontRef idx="minor">
+            <a:schemeClr val="tx1"/>
+          </a:fontRef>
+        </p:style>
+      </p:cxnSp>
+      <p:cxnSp>
+        <p:nvCxnSpPr>
+          <p:cNvPr id="34" name="직선 화살표 연결선 33">
+            <a:extLst>
+              <a:ext uri="{FF2B5EF4-FFF2-40B4-BE49-F238E27FC236}">
+                <a16:creationId xmlns:a16="http://schemas.microsoft.com/office/drawing/2014/main" id="{FD05E9CC-8F2E-4997-9A01-BD182A6E63F4}"/>
+              </a:ext>
+            </a:extLst>
+          </p:cNvPr>
+          <p:cNvCxnSpPr>
+            <a:endCxn id="29" idx="3"/>
+          </p:cNvCxnSpPr>
+          <p:nvPr/>
+        </p:nvCxnSpPr>
+        <p:spPr>
+          <a:xfrm flipH="1">
+            <a:off x="7815766" y="1754599"/>
+            <a:ext cx="1719451" cy="0"/>
+          </a:xfrm>
+          <a:prstGeom prst="straightConnector1">
+            <a:avLst/>
+          </a:prstGeom>
+          <a:ln w="28575">
+            <a:solidFill>
+              <a:schemeClr val="tx1"/>
+            </a:solidFill>
+            <a:tailEnd type="triangle"/>
+          </a:ln>
+        </p:spPr>
+        <p:style>
+          <a:lnRef idx="1">
+            <a:schemeClr val="accent1"/>
+          </a:lnRef>
+          <a:fillRef idx="0">
+            <a:schemeClr val="accent1"/>
+          </a:fillRef>
+          <a:effectRef idx="0">
+            <a:schemeClr val="accent1"/>
+          </a:effectRef>
+          <a:fontRef idx="minor">
+            <a:schemeClr val="tx1"/>
+          </a:fontRef>
+        </p:style>
+      </p:cxnSp>
+      <p:cxnSp>
+        <p:nvCxnSpPr>
+          <p:cNvPr id="35" name="직선 화살표 연결선 34">
+            <a:extLst>
+              <a:ext uri="{FF2B5EF4-FFF2-40B4-BE49-F238E27FC236}">
+                <a16:creationId xmlns:a16="http://schemas.microsoft.com/office/drawing/2014/main" id="{3C9C286B-E0C1-4527-B0B6-F55724C1EB67}"/>
+              </a:ext>
+            </a:extLst>
+          </p:cNvPr>
+          <p:cNvCxnSpPr/>
+          <p:nvPr/>
+        </p:nvCxnSpPr>
+        <p:spPr>
+          <a:xfrm flipH="1">
+            <a:off x="7815766" y="3349070"/>
+            <a:ext cx="1719451" cy="0"/>
+          </a:xfrm>
+          <a:prstGeom prst="straightConnector1">
+            <a:avLst/>
+          </a:prstGeom>
+          <a:ln w="28575">
+            <a:solidFill>
+              <a:schemeClr val="tx1"/>
+            </a:solidFill>
+            <a:tailEnd type="triangle"/>
+          </a:ln>
+        </p:spPr>
+        <p:style>
+          <a:lnRef idx="1">
+            <a:schemeClr val="accent1"/>
+          </a:lnRef>
+          <a:fillRef idx="0">
+            <a:schemeClr val="accent1"/>
+          </a:fillRef>
+          <a:effectRef idx="0">
+            <a:schemeClr val="accent1"/>
+          </a:effectRef>
+          <a:fontRef idx="minor">
+            <a:schemeClr val="tx1"/>
+          </a:fontRef>
+        </p:style>
+      </p:cxnSp>
+      <p:sp>
+        <p:nvSpPr>
+          <p:cNvPr id="36" name="다이아몬드 35">
+            <a:extLst>
+              <a:ext uri="{FF2B5EF4-FFF2-40B4-BE49-F238E27FC236}">
+                <a16:creationId xmlns:a16="http://schemas.microsoft.com/office/drawing/2014/main" id="{D5B8F51A-CC0D-459A-8A00-9F1A3F216D6B}"/>
+              </a:ext>
+            </a:extLst>
+          </p:cNvPr>
+          <p:cNvSpPr/>
+          <p:nvPr/>
+        </p:nvSpPr>
+        <p:spPr>
+          <a:xfrm>
+            <a:off x="6939364" y="3634219"/>
+            <a:ext cx="254214" cy="237491"/>
+          </a:xfrm>
+          <a:prstGeom prst="diamond">
+            <a:avLst/>
+          </a:prstGeom>
+          <a:solidFill>
+            <a:srgbClr val="FFC000"/>
+          </a:solidFill>
+          <a:ln w="38100">
+            <a:solidFill>
+              <a:schemeClr val="tx1"/>
+            </a:solidFill>
+          </a:ln>
+        </p:spPr>
+        <p:style>
+          <a:lnRef idx="2">
+            <a:schemeClr val="accent1">
+              <a:shade val="50000"/>
+            </a:schemeClr>
+          </a:lnRef>
+          <a:fillRef idx="1">
+            <a:schemeClr val="accent1"/>
+          </a:fillRef>
+          <a:effectRef idx="0">
+            <a:schemeClr val="accent1"/>
+          </a:effectRef>
+          <a:fontRef idx="minor">
+            <a:schemeClr val="lt1"/>
+          </a:fontRef>
+        </p:style>
+        <p:txBody>
+          <a:bodyPr rtlCol="0" anchor="ctr"/>
+          <a:lstStyle/>
+          <a:p>
+            <a:pPr algn="ctr"/>
+            <a:endParaRPr lang="ko-KR" altLang="en-US"/>
+          </a:p>
+        </p:txBody>
+      </p:sp>
+      <p:cxnSp>
+        <p:nvCxnSpPr>
+          <p:cNvPr id="37" name="직선 화살표 연결선 36">
+            <a:extLst>
+              <a:ext uri="{FF2B5EF4-FFF2-40B4-BE49-F238E27FC236}">
+                <a16:creationId xmlns:a16="http://schemas.microsoft.com/office/drawing/2014/main" id="{9A440A36-7951-47B1-80BF-F3103B9682C4}"/>
+              </a:ext>
+            </a:extLst>
+          </p:cNvPr>
+          <p:cNvCxnSpPr>
+            <a:cxnSpLocks/>
+            <a:stCxn id="36" idx="2"/>
+          </p:cNvCxnSpPr>
+          <p:nvPr/>
+        </p:nvCxnSpPr>
+        <p:spPr>
+          <a:xfrm>
+            <a:off x="7066471" y="3871710"/>
+            <a:ext cx="0" cy="312771"/>
+          </a:xfrm>
+          <a:prstGeom prst="straightConnector1">
+            <a:avLst/>
+          </a:prstGeom>
+          <a:ln w="38100">
+            <a:solidFill>
+              <a:schemeClr val="tx1"/>
+            </a:solidFill>
+            <a:tailEnd type="triangle"/>
+          </a:ln>
+        </p:spPr>
+        <p:style>
+          <a:lnRef idx="1">
+            <a:schemeClr val="accent1"/>
+          </a:lnRef>
+          <a:fillRef idx="0">
+            <a:schemeClr val="accent1"/>
+          </a:fillRef>
+          <a:effectRef idx="0">
+            <a:schemeClr val="accent1"/>
+          </a:effectRef>
+          <a:fontRef idx="minor">
+            <a:schemeClr val="tx1"/>
+          </a:fontRef>
+        </p:style>
+      </p:cxnSp>
+      <p:sp>
+        <p:nvSpPr>
+          <p:cNvPr id="38" name="직사각형 37">
+            <a:extLst>
+              <a:ext uri="{FF2B5EF4-FFF2-40B4-BE49-F238E27FC236}">
+                <a16:creationId xmlns:a16="http://schemas.microsoft.com/office/drawing/2014/main" id="{7E4E229A-4AF5-4C3C-9B43-D1AE384A0648}"/>
+              </a:ext>
+            </a:extLst>
+          </p:cNvPr>
+          <p:cNvSpPr/>
+          <p:nvPr/>
+        </p:nvSpPr>
+        <p:spPr>
+          <a:xfrm>
+            <a:off x="10844591" y="3553097"/>
+            <a:ext cx="1196458" cy="552450"/>
+          </a:xfrm>
+          <a:prstGeom prst="rect">
+            <a:avLst/>
+          </a:prstGeom>
+          <a:ln w="38100">
+            <a:solidFill>
+              <a:schemeClr val="tx1"/>
+            </a:solidFill>
+          </a:ln>
+        </p:spPr>
+        <p:style>
+          <a:lnRef idx="2">
+            <a:schemeClr val="accent4">
+              <a:shade val="50000"/>
+            </a:schemeClr>
+          </a:lnRef>
+          <a:fillRef idx="1">
+            <a:schemeClr val="accent4"/>
+          </a:fillRef>
+          <a:effectRef idx="0">
+            <a:schemeClr val="accent4"/>
+          </a:effectRef>
+          <a:fontRef idx="minor">
+            <a:schemeClr val="lt1"/>
+          </a:fontRef>
+        </p:style>
+        <p:txBody>
+          <a:bodyPr rtlCol="0" anchor="ctr"/>
+          <a:lstStyle/>
+          <a:p>
+            <a:pPr algn="ctr"/>
+            <a:r>
+              <a:rPr lang="en-US" altLang="ko-KR" sz="1600" b="1" dirty="0" err="1">
+                <a:solidFill>
+                  <a:schemeClr val="tx1"/>
+                </a:solidFill>
+              </a:rPr>
+              <a:t>temp_reg</a:t>
+            </a:r>
+            <a:endParaRPr lang="ko-KR" altLang="en-US" sz="1600" b="1" dirty="0">
+              <a:solidFill>
+                <a:schemeClr val="tx1"/>
+              </a:solidFill>
+            </a:endParaRPr>
+          </a:p>
+        </p:txBody>
+      </p:sp>
+      <p:sp>
+        <p:nvSpPr>
+          <p:cNvPr id="39" name="직사각형 38">
+            <a:extLst>
+              <a:ext uri="{FF2B5EF4-FFF2-40B4-BE49-F238E27FC236}">
+                <a16:creationId xmlns:a16="http://schemas.microsoft.com/office/drawing/2014/main" id="{1AB9A299-CA42-4994-806E-8CD8CA489BBE}"/>
+              </a:ext>
+            </a:extLst>
+          </p:cNvPr>
+          <p:cNvSpPr/>
+          <p:nvPr/>
+        </p:nvSpPr>
+        <p:spPr>
+          <a:xfrm>
+            <a:off x="2682627" y="5531171"/>
+            <a:ext cx="1522481" cy="655200"/>
+          </a:xfrm>
+          <a:prstGeom prst="rect">
+            <a:avLst/>
+          </a:prstGeom>
+        </p:spPr>
+        <p:style>
+          <a:lnRef idx="1">
+            <a:schemeClr val="accent6"/>
+          </a:lnRef>
+          <a:fillRef idx="2">
+            <a:schemeClr val="accent6"/>
+          </a:fillRef>
+          <a:effectRef idx="1">
+            <a:schemeClr val="accent6"/>
+          </a:effectRef>
+          <a:fontRef idx="minor">
+            <a:schemeClr val="dk1"/>
+          </a:fontRef>
+        </p:style>
+        <p:txBody>
+          <a:bodyPr rtlCol="0" anchor="ctr"/>
+          <a:lstStyle/>
+          <a:p>
+            <a:pPr algn="ctr"/>
+            <a:r>
+              <a:rPr lang="en-US" altLang="ko-KR" dirty="0" err="1"/>
+              <a:t>temp_reg</a:t>
+            </a:r>
+            <a:endParaRPr lang="en-US" altLang="ko-KR" dirty="0"/>
+          </a:p>
+          <a:p>
+            <a:pPr algn="ctr"/>
+            <a:r>
+              <a:rPr lang="en-US" altLang="ko-KR" dirty="0"/>
+              <a:t>(</a:t>
+            </a:r>
+            <a:r>
+              <a:rPr lang="en-US" altLang="ko-KR" dirty="0" err="1"/>
+              <a:t>uvm_reg</a:t>
+            </a:r>
+            <a:r>
+              <a:rPr lang="en-US" altLang="ko-KR" dirty="0"/>
+              <a:t>)</a:t>
+            </a:r>
+            <a:endParaRPr lang="ko-KR" altLang="en-US" dirty="0"/>
+          </a:p>
+        </p:txBody>
+      </p:sp>
+      <p:sp>
+        <p:nvSpPr>
+          <p:cNvPr id="40" name="직사각형 39">
+            <a:extLst>
+              <a:ext uri="{FF2B5EF4-FFF2-40B4-BE49-F238E27FC236}">
+                <a16:creationId xmlns:a16="http://schemas.microsoft.com/office/drawing/2014/main" id="{56AC1E4B-11CF-4B99-B1B8-8B284858F27F}"/>
+              </a:ext>
+            </a:extLst>
+          </p:cNvPr>
+          <p:cNvSpPr/>
+          <p:nvPr/>
+        </p:nvSpPr>
+        <p:spPr>
+          <a:xfrm>
+            <a:off x="2682627" y="4162346"/>
+            <a:ext cx="2246811" cy="598405"/>
+          </a:xfrm>
+          <a:prstGeom prst="rect">
+            <a:avLst/>
+          </a:prstGeom>
+          <a:solidFill>
+            <a:srgbClr val="FFFFCC"/>
+          </a:solidFill>
+        </p:spPr>
+        <p:style>
+          <a:lnRef idx="2">
+            <a:schemeClr val="accent1">
+              <a:shade val="50000"/>
+            </a:schemeClr>
+          </a:lnRef>
+          <a:fillRef idx="1">
+            <a:schemeClr val="accent1"/>
+          </a:fillRef>
+          <a:effectRef idx="0">
+            <a:schemeClr val="accent1"/>
+          </a:effectRef>
+          <a:fontRef idx="minor">
+            <a:schemeClr val="lt1"/>
+          </a:fontRef>
+        </p:style>
+        <p:txBody>
+          <a:bodyPr rtlCol="0" anchor="ctr"/>
+          <a:lstStyle/>
+          <a:p>
+            <a:pPr algn="ctr"/>
+            <a:r>
+              <a:rPr lang="en-US" altLang="ko-KR" dirty="0">
+                <a:solidFill>
+                  <a:sysClr val="windowText" lastClr="000000"/>
+                </a:solidFill>
+              </a:rPr>
+              <a:t>reg2apb_adapter</a:t>
+            </a:r>
+            <a:endParaRPr lang="ko-KR" altLang="en-US" dirty="0">
+              <a:solidFill>
+                <a:sysClr val="windowText" lastClr="000000"/>
+              </a:solidFill>
+            </a:endParaRPr>
+          </a:p>
+        </p:txBody>
+      </p:sp>
+      <p:cxnSp>
+        <p:nvCxnSpPr>
+          <p:cNvPr id="41" name="연결선: 구부러짐 40">
+            <a:extLst>
+              <a:ext uri="{FF2B5EF4-FFF2-40B4-BE49-F238E27FC236}">
+                <a16:creationId xmlns:a16="http://schemas.microsoft.com/office/drawing/2014/main" id="{8B5F5F17-3C21-4D3D-AD8F-365C1633113E}"/>
+              </a:ext>
+            </a:extLst>
+          </p:cNvPr>
+          <p:cNvCxnSpPr>
+            <a:stCxn id="22" idx="1"/>
+          </p:cNvCxnSpPr>
+          <p:nvPr/>
+        </p:nvCxnSpPr>
+        <p:spPr>
+          <a:xfrm rot="10800000">
+            <a:off x="2837303" y="3347072"/>
+            <a:ext cx="3012814" cy="2355285"/>
+          </a:xfrm>
+          <a:prstGeom prst="curvedConnector3">
+            <a:avLst>
+              <a:gd name="adj1" fmla="val 111649"/>
+            </a:avLst>
+          </a:prstGeom>
+          <a:ln w="28575">
+            <a:solidFill>
+              <a:schemeClr val="tx1"/>
+            </a:solidFill>
+            <a:tailEnd type="triangle"/>
+          </a:ln>
+        </p:spPr>
+        <p:style>
+          <a:lnRef idx="1">
+            <a:schemeClr val="accent1"/>
+          </a:lnRef>
+          <a:fillRef idx="0">
+            <a:schemeClr val="accent1"/>
+          </a:fillRef>
+          <a:effectRef idx="0">
+            <a:schemeClr val="accent1"/>
+          </a:effectRef>
+          <a:fontRef idx="minor">
+            <a:schemeClr val="tx1"/>
+          </a:fontRef>
+        </p:style>
+      </p:cxnSp>
+    </p:spTree>
+    <p:extLst>
+      <p:ext uri="{BB962C8B-B14F-4D97-AF65-F5344CB8AC3E}">
+        <p14:creationId xmlns:p14="http://schemas.microsoft.com/office/powerpoint/2010/main" val="849624710"/>
       </p:ext>
     </p:extLst>
   </p:cSld>

</xml_diff>

<commit_message>
update predic collision original image
</commit_message>
<xml_diff>
--- a/Jongseob/predictor_collision_test/resource/predictor_collision_test_block_diagram.pptx
+++ b/Jongseob/predictor_collision_test/resource/predictor_collision_test_block_diagram.pptx
@@ -5244,6 +5244,60 @@
           <a:chExt cx="0" cy="0"/>
         </a:xfrm>
       </p:grpSpPr>
+      <p:sp>
+        <p:nvSpPr>
+          <p:cNvPr id="3" name="직사각형 2">
+            <a:extLst>
+              <a:ext uri="{FF2B5EF4-FFF2-40B4-BE49-F238E27FC236}">
+                <a16:creationId xmlns:a16="http://schemas.microsoft.com/office/drawing/2014/main" id="{F98C2AB3-7254-4E1C-8E83-847D6D7CE116}"/>
+              </a:ext>
+            </a:extLst>
+          </p:cNvPr>
+          <p:cNvSpPr/>
+          <p:nvPr/>
+        </p:nvSpPr>
+        <p:spPr>
+          <a:xfrm>
+            <a:off x="830511" y="2416029"/>
+            <a:ext cx="10277127" cy="1812022"/>
+          </a:xfrm>
+          <a:prstGeom prst="rect">
+            <a:avLst/>
+          </a:prstGeom>
+          <a:solidFill>
+            <a:schemeClr val="bg1"/>
+          </a:solidFill>
+          <a:ln>
+            <a:solidFill>
+              <a:schemeClr val="tx1"/>
+            </a:solidFill>
+          </a:ln>
+        </p:spPr>
+        <p:style>
+          <a:lnRef idx="2">
+            <a:schemeClr val="accent1">
+              <a:shade val="50000"/>
+            </a:schemeClr>
+          </a:lnRef>
+          <a:fillRef idx="1">
+            <a:schemeClr val="accent1"/>
+          </a:fillRef>
+          <a:effectRef idx="0">
+            <a:schemeClr val="accent1"/>
+          </a:effectRef>
+          <a:fontRef idx="minor">
+            <a:schemeClr val="lt1"/>
+          </a:fontRef>
+        </p:style>
+        <p:txBody>
+          <a:bodyPr rtlCol="0" anchor="ctr"/>
+          <a:lstStyle/>
+          <a:p>
+            <a:pPr algn="ctr"/>
+            <a:endParaRPr lang="ko-KR" altLang="en-US"/>
+          </a:p>
+        </p:txBody>
+      </p:sp>
       <p:graphicFrame>
         <p:nvGraphicFramePr>
           <p:cNvPr id="2" name="표 2">
@@ -5851,7 +5905,11 @@
             <a:lstStyle/>
             <a:p>
               <a:pPr algn="ctr"/>
-              <a:endParaRPr lang="ko-KR" altLang="en-US"/>
+              <a:r>
+                <a:rPr lang="ko-KR" altLang="en-US"/>
+                <a:t>ㅇ</a:t>
+              </a:r>
+              <a:endParaRPr lang="ko-KR" altLang="en-US" dirty="0"/>
             </a:p>
           </p:txBody>
         </p:sp>
@@ -7411,6 +7469,778 @@
           </a:fontRef>
         </p:style>
       </p:cxnSp>
+      <p:cxnSp>
+        <p:nvCxnSpPr>
+          <p:cNvPr id="43" name="직선 연결선 42">
+            <a:extLst>
+              <a:ext uri="{FF2B5EF4-FFF2-40B4-BE49-F238E27FC236}">
+                <a16:creationId xmlns:a16="http://schemas.microsoft.com/office/drawing/2014/main" id="{558D2E7B-CEAD-4486-A595-38130010C9CE}"/>
+              </a:ext>
+            </a:extLst>
+          </p:cNvPr>
+          <p:cNvCxnSpPr>
+            <a:cxnSpLocks/>
+          </p:cNvCxnSpPr>
+          <p:nvPr/>
+        </p:nvCxnSpPr>
+        <p:spPr>
+          <a:xfrm>
+            <a:off x="309848" y="1689823"/>
+            <a:ext cx="4619590" cy="3409"/>
+          </a:xfrm>
+          <a:prstGeom prst="line">
+            <a:avLst/>
+          </a:prstGeom>
+          <a:ln w="76200">
+            <a:solidFill>
+              <a:schemeClr val="accent4"/>
+            </a:solidFill>
+          </a:ln>
+        </p:spPr>
+        <p:style>
+          <a:lnRef idx="1">
+            <a:schemeClr val="accent1"/>
+          </a:lnRef>
+          <a:fillRef idx="0">
+            <a:schemeClr val="accent1"/>
+          </a:fillRef>
+          <a:effectRef idx="0">
+            <a:schemeClr val="accent1"/>
+          </a:effectRef>
+          <a:fontRef idx="minor">
+            <a:schemeClr val="tx1"/>
+          </a:fontRef>
+        </p:style>
+      </p:cxnSp>
+      <p:cxnSp>
+        <p:nvCxnSpPr>
+          <p:cNvPr id="45" name="직선 연결선 44">
+            <a:extLst>
+              <a:ext uri="{FF2B5EF4-FFF2-40B4-BE49-F238E27FC236}">
+                <a16:creationId xmlns:a16="http://schemas.microsoft.com/office/drawing/2014/main" id="{7C570616-9048-40FA-BAFB-2021B3C2CEF5}"/>
+              </a:ext>
+            </a:extLst>
+          </p:cNvPr>
+          <p:cNvCxnSpPr>
+            <a:cxnSpLocks/>
+          </p:cNvCxnSpPr>
+          <p:nvPr/>
+        </p:nvCxnSpPr>
+        <p:spPr>
+          <a:xfrm flipV="1">
+            <a:off x="4938075" y="1118208"/>
+            <a:ext cx="1448636" cy="571615"/>
+          </a:xfrm>
+          <a:prstGeom prst="line">
+            <a:avLst/>
+          </a:prstGeom>
+          <a:ln w="76200">
+            <a:solidFill>
+              <a:schemeClr val="accent4"/>
+            </a:solidFill>
+          </a:ln>
+        </p:spPr>
+        <p:style>
+          <a:lnRef idx="1">
+            <a:schemeClr val="accent1"/>
+          </a:lnRef>
+          <a:fillRef idx="0">
+            <a:schemeClr val="accent1"/>
+          </a:fillRef>
+          <a:effectRef idx="0">
+            <a:schemeClr val="accent1"/>
+          </a:effectRef>
+          <a:fontRef idx="minor">
+            <a:schemeClr val="tx1"/>
+          </a:fontRef>
+        </p:style>
+      </p:cxnSp>
+      <p:cxnSp>
+        <p:nvCxnSpPr>
+          <p:cNvPr id="47" name="직선 연결선 46">
+            <a:extLst>
+              <a:ext uri="{FF2B5EF4-FFF2-40B4-BE49-F238E27FC236}">
+                <a16:creationId xmlns:a16="http://schemas.microsoft.com/office/drawing/2014/main" id="{6C19F558-4655-4FC0-913B-D35E9EC0C974}"/>
+              </a:ext>
+            </a:extLst>
+          </p:cNvPr>
+          <p:cNvCxnSpPr/>
+          <p:nvPr/>
+        </p:nvCxnSpPr>
+        <p:spPr>
+          <a:xfrm>
+            <a:off x="6375633" y="1120975"/>
+            <a:ext cx="3546840" cy="0"/>
+          </a:xfrm>
+          <a:prstGeom prst="line">
+            <a:avLst/>
+          </a:prstGeom>
+          <a:ln w="76200">
+            <a:solidFill>
+              <a:schemeClr val="accent4"/>
+            </a:solidFill>
+          </a:ln>
+        </p:spPr>
+        <p:style>
+          <a:lnRef idx="1">
+            <a:schemeClr val="accent1"/>
+          </a:lnRef>
+          <a:fillRef idx="0">
+            <a:schemeClr val="accent1"/>
+          </a:fillRef>
+          <a:effectRef idx="0">
+            <a:schemeClr val="accent1"/>
+          </a:effectRef>
+          <a:fontRef idx="minor">
+            <a:schemeClr val="tx1"/>
+          </a:fontRef>
+        </p:style>
+      </p:cxnSp>
+      <p:cxnSp>
+        <p:nvCxnSpPr>
+          <p:cNvPr id="49" name="직선 화살표 연결선 48">
+            <a:extLst>
+              <a:ext uri="{FF2B5EF4-FFF2-40B4-BE49-F238E27FC236}">
+                <a16:creationId xmlns:a16="http://schemas.microsoft.com/office/drawing/2014/main" id="{4A2DE888-A9C7-48CE-B37A-EDD7909CEBB7}"/>
+              </a:ext>
+            </a:extLst>
+          </p:cNvPr>
+          <p:cNvCxnSpPr>
+            <a:endCxn id="38" idx="0"/>
+          </p:cNvCxnSpPr>
+          <p:nvPr/>
+        </p:nvCxnSpPr>
+        <p:spPr>
+          <a:xfrm>
+            <a:off x="9922473" y="1118208"/>
+            <a:ext cx="1520347" cy="2434889"/>
+          </a:xfrm>
+          <a:prstGeom prst="straightConnector1">
+            <a:avLst/>
+          </a:prstGeom>
+          <a:ln w="76200">
+            <a:solidFill>
+              <a:schemeClr val="accent4"/>
+            </a:solidFill>
+            <a:tailEnd type="triangle"/>
+          </a:ln>
+        </p:spPr>
+        <p:style>
+          <a:lnRef idx="1">
+            <a:schemeClr val="accent1"/>
+          </a:lnRef>
+          <a:fillRef idx="0">
+            <a:schemeClr val="accent1"/>
+          </a:fillRef>
+          <a:effectRef idx="0">
+            <a:schemeClr val="accent1"/>
+          </a:effectRef>
+          <a:fontRef idx="minor">
+            <a:schemeClr val="tx1"/>
+          </a:fontRef>
+        </p:style>
+      </p:cxnSp>
+      <p:sp>
+        <p:nvSpPr>
+          <p:cNvPr id="52" name="TextBox 51">
+            <a:extLst>
+              <a:ext uri="{FF2B5EF4-FFF2-40B4-BE49-F238E27FC236}">
+                <a16:creationId xmlns:a16="http://schemas.microsoft.com/office/drawing/2014/main" id="{72625B51-5DF0-4A02-BB6E-FABF9F1060BC}"/>
+              </a:ext>
+            </a:extLst>
+          </p:cNvPr>
+          <p:cNvSpPr txBox="1"/>
+          <p:nvPr/>
+        </p:nvSpPr>
+        <p:spPr>
+          <a:xfrm>
+            <a:off x="789008" y="1088734"/>
+            <a:ext cx="460055" cy="584775"/>
+          </a:xfrm>
+          <a:prstGeom prst="rect">
+            <a:avLst/>
+          </a:prstGeom>
+          <a:noFill/>
+          <a:ln>
+            <a:noFill/>
+          </a:ln>
+        </p:spPr>
+        <p:txBody>
+          <a:bodyPr wrap="square" rtlCol="0">
+            <a:spAutoFit/>
+          </a:bodyPr>
+          <a:lstStyle/>
+          <a:p>
+            <a:r>
+              <a:rPr lang="ko-KR" altLang="en-US" sz="3200" b="1" dirty="0">
+                <a:solidFill>
+                  <a:srgbClr val="FFC000"/>
+                </a:solidFill>
+              </a:rPr>
+              <a:t>①</a:t>
+            </a:r>
+            <a:endParaRPr lang="ko-KR" altLang="en-US" b="1" dirty="0">
+              <a:solidFill>
+                <a:srgbClr val="FFC000"/>
+              </a:solidFill>
+            </a:endParaRPr>
+          </a:p>
+        </p:txBody>
+      </p:sp>
+      <p:cxnSp>
+        <p:nvCxnSpPr>
+          <p:cNvPr id="54" name="직선 연결선 53">
+            <a:extLst>
+              <a:ext uri="{FF2B5EF4-FFF2-40B4-BE49-F238E27FC236}">
+                <a16:creationId xmlns:a16="http://schemas.microsoft.com/office/drawing/2014/main" id="{F3752EDF-815A-4C65-86A7-9CE7C595C615}"/>
+              </a:ext>
+            </a:extLst>
+          </p:cNvPr>
+          <p:cNvCxnSpPr/>
+          <p:nvPr/>
+        </p:nvCxnSpPr>
+        <p:spPr>
+          <a:xfrm flipH="1">
+            <a:off x="7193578" y="3347071"/>
+            <a:ext cx="2487317" cy="0"/>
+          </a:xfrm>
+          <a:prstGeom prst="line">
+            <a:avLst/>
+          </a:prstGeom>
+          <a:ln w="76200">
+            <a:solidFill>
+              <a:srgbClr val="0000FF"/>
+            </a:solidFill>
+          </a:ln>
+        </p:spPr>
+        <p:style>
+          <a:lnRef idx="1">
+            <a:schemeClr val="accent1"/>
+          </a:lnRef>
+          <a:fillRef idx="0">
+            <a:schemeClr val="accent1"/>
+          </a:fillRef>
+          <a:effectRef idx="0">
+            <a:schemeClr val="accent1"/>
+          </a:effectRef>
+          <a:fontRef idx="minor">
+            <a:schemeClr val="tx1"/>
+          </a:fontRef>
+        </p:style>
+      </p:cxnSp>
+      <p:cxnSp>
+        <p:nvCxnSpPr>
+          <p:cNvPr id="56" name="직선 연결선 55">
+            <a:extLst>
+              <a:ext uri="{FF2B5EF4-FFF2-40B4-BE49-F238E27FC236}">
+                <a16:creationId xmlns:a16="http://schemas.microsoft.com/office/drawing/2014/main" id="{19136E38-5001-4546-83B0-810586FE1CAF}"/>
+              </a:ext>
+            </a:extLst>
+          </p:cNvPr>
+          <p:cNvCxnSpPr/>
+          <p:nvPr/>
+        </p:nvCxnSpPr>
+        <p:spPr>
+          <a:xfrm flipH="1">
+            <a:off x="7066471" y="3347071"/>
+            <a:ext cx="127107" cy="1074347"/>
+          </a:xfrm>
+          <a:prstGeom prst="line">
+            <a:avLst/>
+          </a:prstGeom>
+          <a:ln w="76200">
+            <a:solidFill>
+              <a:srgbClr val="0000FF"/>
+            </a:solidFill>
+          </a:ln>
+        </p:spPr>
+        <p:style>
+          <a:lnRef idx="1">
+            <a:schemeClr val="accent1"/>
+          </a:lnRef>
+          <a:fillRef idx="0">
+            <a:schemeClr val="accent1"/>
+          </a:fillRef>
+          <a:effectRef idx="0">
+            <a:schemeClr val="accent1"/>
+          </a:effectRef>
+          <a:fontRef idx="minor">
+            <a:schemeClr val="tx1"/>
+          </a:fontRef>
+        </p:style>
+      </p:cxnSp>
+      <p:cxnSp>
+        <p:nvCxnSpPr>
+          <p:cNvPr id="58" name="직선 연결선 57">
+            <a:extLst>
+              <a:ext uri="{FF2B5EF4-FFF2-40B4-BE49-F238E27FC236}">
+                <a16:creationId xmlns:a16="http://schemas.microsoft.com/office/drawing/2014/main" id="{9749CB6A-ACE5-44B0-83EE-477607006FAE}"/>
+              </a:ext>
+            </a:extLst>
+          </p:cNvPr>
+          <p:cNvCxnSpPr/>
+          <p:nvPr/>
+        </p:nvCxnSpPr>
+        <p:spPr>
+          <a:xfrm flipH="1">
+            <a:off x="6246903" y="4413554"/>
+            <a:ext cx="828206" cy="1117617"/>
+          </a:xfrm>
+          <a:prstGeom prst="line">
+            <a:avLst/>
+          </a:prstGeom>
+          <a:ln w="76200">
+            <a:solidFill>
+              <a:srgbClr val="0000FF"/>
+            </a:solidFill>
+          </a:ln>
+        </p:spPr>
+        <p:style>
+          <a:lnRef idx="1">
+            <a:schemeClr val="accent1"/>
+          </a:lnRef>
+          <a:fillRef idx="0">
+            <a:schemeClr val="accent1"/>
+          </a:fillRef>
+          <a:effectRef idx="0">
+            <a:schemeClr val="accent1"/>
+          </a:effectRef>
+          <a:fontRef idx="minor">
+            <a:schemeClr val="tx1"/>
+          </a:fontRef>
+        </p:style>
+      </p:cxnSp>
+      <p:cxnSp>
+        <p:nvCxnSpPr>
+          <p:cNvPr id="62" name="직선 화살표 연결선 61">
+            <a:extLst>
+              <a:ext uri="{FF2B5EF4-FFF2-40B4-BE49-F238E27FC236}">
+                <a16:creationId xmlns:a16="http://schemas.microsoft.com/office/drawing/2014/main" id="{51364135-F8D9-4F8E-8214-46F11EF1C218}"/>
+              </a:ext>
+            </a:extLst>
+          </p:cNvPr>
+          <p:cNvCxnSpPr>
+            <a:endCxn id="39" idx="3"/>
+          </p:cNvCxnSpPr>
+          <p:nvPr/>
+        </p:nvCxnSpPr>
+        <p:spPr>
+          <a:xfrm flipH="1">
+            <a:off x="4205108" y="5531171"/>
+            <a:ext cx="2041795" cy="327600"/>
+          </a:xfrm>
+          <a:prstGeom prst="straightConnector1">
+            <a:avLst/>
+          </a:prstGeom>
+          <a:ln w="76200">
+            <a:solidFill>
+              <a:srgbClr val="0000FF"/>
+            </a:solidFill>
+            <a:tailEnd type="triangle"/>
+          </a:ln>
+        </p:spPr>
+        <p:style>
+          <a:lnRef idx="1">
+            <a:schemeClr val="accent1"/>
+          </a:lnRef>
+          <a:fillRef idx="0">
+            <a:schemeClr val="accent1"/>
+          </a:fillRef>
+          <a:effectRef idx="0">
+            <a:schemeClr val="accent1"/>
+          </a:effectRef>
+          <a:fontRef idx="minor">
+            <a:schemeClr val="tx1"/>
+          </a:fontRef>
+        </p:style>
+      </p:cxnSp>
+      <p:sp>
+        <p:nvSpPr>
+          <p:cNvPr id="63" name="TextBox 62">
+            <a:extLst>
+              <a:ext uri="{FF2B5EF4-FFF2-40B4-BE49-F238E27FC236}">
+                <a16:creationId xmlns:a16="http://schemas.microsoft.com/office/drawing/2014/main" id="{DC9E7E02-74B5-4F92-9AA9-26DD6C9271E7}"/>
+              </a:ext>
+            </a:extLst>
+          </p:cNvPr>
+          <p:cNvSpPr txBox="1"/>
+          <p:nvPr/>
+        </p:nvSpPr>
+        <p:spPr>
+          <a:xfrm>
+            <a:off x="8627292" y="2813942"/>
+            <a:ext cx="300828" cy="584775"/>
+          </a:xfrm>
+          <a:prstGeom prst="rect">
+            <a:avLst/>
+          </a:prstGeom>
+          <a:noFill/>
+        </p:spPr>
+        <p:txBody>
+          <a:bodyPr wrap="square" rtlCol="0">
+            <a:spAutoFit/>
+          </a:bodyPr>
+          <a:lstStyle/>
+          <a:p>
+            <a:r>
+              <a:rPr lang="ko-KR" altLang="en-US" sz="3200" b="1" dirty="0">
+                <a:solidFill>
+                  <a:srgbClr val="0000FF"/>
+                </a:solidFill>
+              </a:rPr>
+              <a:t>②</a:t>
+            </a:r>
+          </a:p>
+        </p:txBody>
+      </p:sp>
+      <p:cxnSp>
+        <p:nvCxnSpPr>
+          <p:cNvPr id="67" name="직선 연결선 66">
+            <a:extLst>
+              <a:ext uri="{FF2B5EF4-FFF2-40B4-BE49-F238E27FC236}">
+                <a16:creationId xmlns:a16="http://schemas.microsoft.com/office/drawing/2014/main" id="{F3852D71-A5C3-4514-BE82-EBC829541CA3}"/>
+              </a:ext>
+            </a:extLst>
+          </p:cNvPr>
+          <p:cNvCxnSpPr/>
+          <p:nvPr/>
+        </p:nvCxnSpPr>
+        <p:spPr>
+          <a:xfrm flipH="1" flipV="1">
+            <a:off x="4517438" y="3429000"/>
+            <a:ext cx="1332679" cy="2023844"/>
+          </a:xfrm>
+          <a:prstGeom prst="line">
+            <a:avLst/>
+          </a:prstGeom>
+          <a:ln w="76200">
+            <a:solidFill>
+              <a:srgbClr val="00FF00"/>
+            </a:solidFill>
+          </a:ln>
+        </p:spPr>
+        <p:style>
+          <a:lnRef idx="1">
+            <a:schemeClr val="accent1"/>
+          </a:lnRef>
+          <a:fillRef idx="0">
+            <a:schemeClr val="accent1"/>
+          </a:fillRef>
+          <a:effectRef idx="0">
+            <a:schemeClr val="accent1"/>
+          </a:effectRef>
+          <a:fontRef idx="minor">
+            <a:schemeClr val="tx1"/>
+          </a:fontRef>
+        </p:style>
+      </p:cxnSp>
+      <p:cxnSp>
+        <p:nvCxnSpPr>
+          <p:cNvPr id="69" name="직선 연결선 68">
+            <a:extLst>
+              <a:ext uri="{FF2B5EF4-FFF2-40B4-BE49-F238E27FC236}">
+                <a16:creationId xmlns:a16="http://schemas.microsoft.com/office/drawing/2014/main" id="{754A3978-D1F1-46B9-A26E-2D0F76E71EA4}"/>
+              </a:ext>
+            </a:extLst>
+          </p:cNvPr>
+          <p:cNvCxnSpPr/>
+          <p:nvPr/>
+        </p:nvCxnSpPr>
+        <p:spPr>
+          <a:xfrm flipV="1">
+            <a:off x="4517438" y="2774353"/>
+            <a:ext cx="1674082" cy="670708"/>
+          </a:xfrm>
+          <a:prstGeom prst="line">
+            <a:avLst/>
+          </a:prstGeom>
+          <a:ln w="76200">
+            <a:solidFill>
+              <a:srgbClr val="00FF00"/>
+            </a:solidFill>
+          </a:ln>
+        </p:spPr>
+        <p:style>
+          <a:lnRef idx="1">
+            <a:schemeClr val="accent1"/>
+          </a:lnRef>
+          <a:fillRef idx="0">
+            <a:schemeClr val="accent1"/>
+          </a:fillRef>
+          <a:effectRef idx="0">
+            <a:schemeClr val="accent1"/>
+          </a:effectRef>
+          <a:fontRef idx="minor">
+            <a:schemeClr val="tx1"/>
+          </a:fontRef>
+        </p:style>
+      </p:cxnSp>
+      <p:cxnSp>
+        <p:nvCxnSpPr>
+          <p:cNvPr id="71" name="직선 연결선 70">
+            <a:extLst>
+              <a:ext uri="{FF2B5EF4-FFF2-40B4-BE49-F238E27FC236}">
+                <a16:creationId xmlns:a16="http://schemas.microsoft.com/office/drawing/2014/main" id="{7197D65C-2104-4F13-8E7C-3958CEA26829}"/>
+              </a:ext>
+            </a:extLst>
+          </p:cNvPr>
+          <p:cNvCxnSpPr/>
+          <p:nvPr/>
+        </p:nvCxnSpPr>
+        <p:spPr>
+          <a:xfrm>
+            <a:off x="6191520" y="2781927"/>
+            <a:ext cx="3643006" cy="132263"/>
+          </a:xfrm>
+          <a:prstGeom prst="line">
+            <a:avLst/>
+          </a:prstGeom>
+          <a:ln w="76200">
+            <a:solidFill>
+              <a:srgbClr val="00FF00"/>
+            </a:solidFill>
+          </a:ln>
+        </p:spPr>
+        <p:style>
+          <a:lnRef idx="1">
+            <a:schemeClr val="accent1"/>
+          </a:lnRef>
+          <a:fillRef idx="0">
+            <a:schemeClr val="accent1"/>
+          </a:fillRef>
+          <a:effectRef idx="0">
+            <a:schemeClr val="accent1"/>
+          </a:effectRef>
+          <a:fontRef idx="minor">
+            <a:schemeClr val="tx1"/>
+          </a:fontRef>
+        </p:style>
+      </p:cxnSp>
+      <p:cxnSp>
+        <p:nvCxnSpPr>
+          <p:cNvPr id="75" name="직선 화살표 연결선 74">
+            <a:extLst>
+              <a:ext uri="{FF2B5EF4-FFF2-40B4-BE49-F238E27FC236}">
+                <a16:creationId xmlns:a16="http://schemas.microsoft.com/office/drawing/2014/main" id="{4D36F2C0-DED2-422A-81D6-5EFF290A1CD8}"/>
+              </a:ext>
+            </a:extLst>
+          </p:cNvPr>
+          <p:cNvCxnSpPr/>
+          <p:nvPr/>
+        </p:nvCxnSpPr>
+        <p:spPr>
+          <a:xfrm>
+            <a:off x="9834526" y="2914190"/>
+            <a:ext cx="1230553" cy="716167"/>
+          </a:xfrm>
+          <a:prstGeom prst="straightConnector1">
+            <a:avLst/>
+          </a:prstGeom>
+          <a:ln w="76200">
+            <a:solidFill>
+              <a:srgbClr val="00FF00"/>
+            </a:solidFill>
+            <a:tailEnd type="triangle"/>
+          </a:ln>
+        </p:spPr>
+        <p:style>
+          <a:lnRef idx="1">
+            <a:schemeClr val="accent1"/>
+          </a:lnRef>
+          <a:fillRef idx="0">
+            <a:schemeClr val="accent1"/>
+          </a:fillRef>
+          <a:effectRef idx="0">
+            <a:schemeClr val="accent1"/>
+          </a:effectRef>
+          <a:fontRef idx="minor">
+            <a:schemeClr val="tx1"/>
+          </a:fontRef>
+        </p:style>
+      </p:cxnSp>
+      <p:sp>
+        <p:nvSpPr>
+          <p:cNvPr id="76" name="TextBox 75">
+            <a:extLst>
+              <a:ext uri="{FF2B5EF4-FFF2-40B4-BE49-F238E27FC236}">
+                <a16:creationId xmlns:a16="http://schemas.microsoft.com/office/drawing/2014/main" id="{EF623291-CA82-498C-947A-C5E7215A4E79}"/>
+              </a:ext>
+            </a:extLst>
+          </p:cNvPr>
+          <p:cNvSpPr txBox="1"/>
+          <p:nvPr/>
+        </p:nvSpPr>
+        <p:spPr>
+          <a:xfrm>
+            <a:off x="4974632" y="2500784"/>
+            <a:ext cx="392281" cy="584775"/>
+          </a:xfrm>
+          <a:prstGeom prst="rect">
+            <a:avLst/>
+          </a:prstGeom>
+          <a:noFill/>
+        </p:spPr>
+        <p:txBody>
+          <a:bodyPr wrap="square" rtlCol="0">
+            <a:spAutoFit/>
+          </a:bodyPr>
+          <a:lstStyle/>
+          <a:p>
+            <a:r>
+              <a:rPr lang="ko-KR" altLang="en-US" sz="3200" b="1" dirty="0">
+                <a:solidFill>
+                  <a:srgbClr val="00FF00"/>
+                </a:solidFill>
+              </a:rPr>
+              <a:t>③</a:t>
+            </a:r>
+          </a:p>
+        </p:txBody>
+      </p:sp>
+      <p:cxnSp>
+        <p:nvCxnSpPr>
+          <p:cNvPr id="78" name="직선 연결선 77">
+            <a:extLst>
+              <a:ext uri="{FF2B5EF4-FFF2-40B4-BE49-F238E27FC236}">
+                <a16:creationId xmlns:a16="http://schemas.microsoft.com/office/drawing/2014/main" id="{6EAC8B74-8CB7-4FA8-89A8-56CA1196D6A6}"/>
+              </a:ext>
+            </a:extLst>
+          </p:cNvPr>
+          <p:cNvCxnSpPr/>
+          <p:nvPr/>
+        </p:nvCxnSpPr>
+        <p:spPr>
+          <a:xfrm flipH="1">
+            <a:off x="7306811" y="3445061"/>
+            <a:ext cx="2374084" cy="0"/>
+          </a:xfrm>
+          <a:prstGeom prst="line">
+            <a:avLst/>
+          </a:prstGeom>
+          <a:ln w="76200">
+            <a:solidFill>
+              <a:srgbClr val="FF0000"/>
+            </a:solidFill>
+          </a:ln>
+        </p:spPr>
+        <p:style>
+          <a:lnRef idx="1">
+            <a:schemeClr val="accent1"/>
+          </a:lnRef>
+          <a:fillRef idx="0">
+            <a:schemeClr val="accent1"/>
+          </a:fillRef>
+          <a:effectRef idx="0">
+            <a:schemeClr val="accent1"/>
+          </a:effectRef>
+          <a:fontRef idx="minor">
+            <a:schemeClr val="tx1"/>
+          </a:fontRef>
+        </p:style>
+      </p:cxnSp>
+      <p:cxnSp>
+        <p:nvCxnSpPr>
+          <p:cNvPr id="84" name="직선 화살표 연결선 83">
+            <a:extLst>
+              <a:ext uri="{FF2B5EF4-FFF2-40B4-BE49-F238E27FC236}">
+                <a16:creationId xmlns:a16="http://schemas.microsoft.com/office/drawing/2014/main" id="{A9EEFBDF-1433-4223-9933-4C4B89AF1592}"/>
+              </a:ext>
+            </a:extLst>
+          </p:cNvPr>
+          <p:cNvCxnSpPr/>
+          <p:nvPr/>
+        </p:nvCxnSpPr>
+        <p:spPr>
+          <a:xfrm flipH="1">
+            <a:off x="7193578" y="3445061"/>
+            <a:ext cx="121622" cy="976357"/>
+          </a:xfrm>
+          <a:prstGeom prst="straightConnector1">
+            <a:avLst/>
+          </a:prstGeom>
+          <a:ln w="76200">
+            <a:solidFill>
+              <a:srgbClr val="FF0000"/>
+            </a:solidFill>
+            <a:tailEnd type="triangle"/>
+          </a:ln>
+        </p:spPr>
+        <p:style>
+          <a:lnRef idx="1">
+            <a:schemeClr val="accent1"/>
+          </a:lnRef>
+          <a:fillRef idx="0">
+            <a:schemeClr val="accent1"/>
+          </a:fillRef>
+          <a:effectRef idx="0">
+            <a:schemeClr val="accent1"/>
+          </a:effectRef>
+          <a:fontRef idx="minor">
+            <a:schemeClr val="tx1"/>
+          </a:fontRef>
+        </p:style>
+      </p:cxnSp>
+      <p:sp>
+        <p:nvSpPr>
+          <p:cNvPr id="85" name="TextBox 84">
+            <a:extLst>
+              <a:ext uri="{FF2B5EF4-FFF2-40B4-BE49-F238E27FC236}">
+                <a16:creationId xmlns:a16="http://schemas.microsoft.com/office/drawing/2014/main" id="{B0E00E85-5BC3-4C39-8000-94841DF964FC}"/>
+              </a:ext>
+            </a:extLst>
+          </p:cNvPr>
+          <p:cNvSpPr txBox="1"/>
+          <p:nvPr/>
+        </p:nvSpPr>
+        <p:spPr>
+          <a:xfrm>
+            <a:off x="7786051" y="3359485"/>
+            <a:ext cx="2185823" cy="1077218"/>
+          </a:xfrm>
+          <a:prstGeom prst="rect">
+            <a:avLst/>
+          </a:prstGeom>
+          <a:noFill/>
+        </p:spPr>
+        <p:txBody>
+          <a:bodyPr wrap="square" rtlCol="0">
+            <a:spAutoFit/>
+          </a:bodyPr>
+          <a:lstStyle/>
+          <a:p>
+            <a:pPr algn="ctr"/>
+            <a:r>
+              <a:rPr lang="ko-KR" altLang="en-US" sz="3200" b="1" dirty="0">
+                <a:solidFill>
+                  <a:srgbClr val="FF0000"/>
+                </a:solidFill>
+              </a:rPr>
+              <a:t>④</a:t>
+            </a:r>
+            <a:endParaRPr lang="en-US" altLang="ko-KR" sz="3200" b="1" dirty="0">
+              <a:solidFill>
+                <a:srgbClr val="FF0000"/>
+              </a:solidFill>
+            </a:endParaRPr>
+          </a:p>
+          <a:p>
+            <a:pPr algn="ctr"/>
+            <a:r>
+              <a:rPr lang="en-US" altLang="ko-KR" sz="3200" b="1" dirty="0">
+                <a:solidFill>
+                  <a:srgbClr val="FF0000"/>
+                </a:solidFill>
+              </a:rPr>
+              <a:t>Error</a:t>
+            </a:r>
+            <a:endParaRPr lang="ko-KR" altLang="en-US" sz="3200" b="1" dirty="0">
+              <a:solidFill>
+                <a:srgbClr val="FF0000"/>
+              </a:solidFill>
+            </a:endParaRPr>
+          </a:p>
+        </p:txBody>
+      </p:sp>
     </p:spTree>
     <p:extLst>
       <p:ext uri="{BB962C8B-B14F-4D97-AF65-F5344CB8AC3E}">

</xml_diff>